<commit_message>
Updates for BEA Workshop 5 June
</commit_message>
<xml_diff>
--- a/materials/BEA_EdMeasurement and Item Development_Day4.pptx
+++ b/materials/BEA_EdMeasurement and Item Development_Day4.pptx
@@ -142,7 +142,7 @@
 <file path=ppt/revisionInfo.xml><?xml version="1.0" encoding="utf-8"?>
 <p1510:revInfo xmlns:a="http://schemas.openxmlformats.org/drawingml/2006/main" xmlns:r="http://schemas.openxmlformats.org/officeDocument/2006/relationships" xmlns:p1510="http://schemas.microsoft.com/office/powerpoint/2015/10/main">
   <p1510:revLst>
-    <p1510:client id="{1B902FBA-5F4A-4FBD-BC0F-75F5DEB82E8D}" v="20" dt="2025-06-03T14:19:50.438"/>
+    <p1510:client id="{1B902FBA-5F4A-4FBD-BC0F-75F5DEB82E8D}" v="21" dt="2025-06-05T08:13:52.652"/>
   </p1510:revLst>
 </p1510:revInfo>
 </file>
@@ -921,7 +921,7 @@
   <pc:docChgLst>
     <pc:chgData name="REINERTSEN Nate, EDU/SBS" userId="9179661c-9943-48ce-aed0-0d18650acacf" providerId="ADAL" clId="{1B902FBA-5F4A-4FBD-BC0F-75F5DEB82E8D}"/>
     <pc:docChg chg="undo custSel addSld delSld modSld sldOrd modMainMaster">
-      <pc:chgData name="REINERTSEN Nate, EDU/SBS" userId="9179661c-9943-48ce-aed0-0d18650acacf" providerId="ADAL" clId="{1B902FBA-5F4A-4FBD-BC0F-75F5DEB82E8D}" dt="2025-06-03T14:24:11.729" v="328" actId="27636"/>
+      <pc:chgData name="REINERTSEN Nate, EDU/SBS" userId="9179661c-9943-48ce-aed0-0d18650acacf" providerId="ADAL" clId="{1B902FBA-5F4A-4FBD-BC0F-75F5DEB82E8D}" dt="2025-06-05T08:13:52.652" v="329" actId="14826"/>
       <pc:docMkLst>
         <pc:docMk/>
       </pc:docMkLst>
@@ -1588,7 +1588,7 @@
         </pc:spChg>
       </pc:sldChg>
       <pc:sldChg chg="modSp setBg">
-        <pc:chgData name="REINERTSEN Nate, EDU/SBS" userId="9179661c-9943-48ce-aed0-0d18650acacf" providerId="ADAL" clId="{1B902FBA-5F4A-4FBD-BC0F-75F5DEB82E8D}" dt="2025-06-03T14:17:54.768" v="83"/>
+        <pc:chgData name="REINERTSEN Nate, EDU/SBS" userId="9179661c-9943-48ce-aed0-0d18650acacf" providerId="ADAL" clId="{1B902FBA-5F4A-4FBD-BC0F-75F5DEB82E8D}" dt="2025-06-05T08:13:52.652" v="329" actId="14826"/>
         <pc:sldMkLst>
           <pc:docMk/>
           <pc:sldMk cId="2135648495" sldId="876"/>
@@ -1601,6 +1601,14 @@
             <ac:spMk id="13" creationId="{D821B662-0662-1AB6-FCED-24A7BCA45935}"/>
           </ac:spMkLst>
         </pc:spChg>
+        <pc:picChg chg="mod">
+          <ac:chgData name="REINERTSEN Nate, EDU/SBS" userId="9179661c-9943-48ce-aed0-0d18650acacf" providerId="ADAL" clId="{1B902FBA-5F4A-4FBD-BC0F-75F5DEB82E8D}" dt="2025-06-05T08:13:52.652" v="329" actId="14826"/>
+          <ac:picMkLst>
+            <pc:docMk/>
+            <pc:sldMk cId="2135648495" sldId="876"/>
+            <ac:picMk id="15" creationId="{26626799-95BE-D985-B0D4-D7182F430F24}"/>
+          </ac:picMkLst>
+        </pc:picChg>
       </pc:sldChg>
       <pc:sldChg chg="modSp mod setBg">
         <pc:chgData name="REINERTSEN Nate, EDU/SBS" userId="9179661c-9943-48ce-aed0-0d18650acacf" providerId="ADAL" clId="{1B902FBA-5F4A-4FBD-BC0F-75F5DEB82E8D}" dt="2025-06-03T14:19:19.067" v="152" actId="20577"/>
@@ -6196,7 +6204,7 @@
           <a:p>
             <a:fld id="{58B1EEDF-6E6B-4E64-957F-6FA666DAE532}" type="datetimeFigureOut">
               <a:rPr lang="en-GB" smtClean="0"/>
-              <a:t>03/06/2025</a:t>
+              <a:t>05/06/2025</a:t>
             </a:fld>
             <a:endParaRPr lang="en-GB"/>
           </a:p>
@@ -49747,7 +49755,7 @@
       </p:sp>
       <p:pic>
         <p:nvPicPr>
-          <p:cNvPr id="15" name="Picture 14" descr="A qr code on a green background">
+          <p:cNvPr id="15" name="Picture 14">
             <a:extLst>
               <a:ext uri="{FF2B5EF4-FFF2-40B4-BE49-F238E27FC236}">
                 <a16:creationId xmlns:a16="http://schemas.microsoft.com/office/drawing/2014/main" id="{26626799-95BE-D985-B0D4-D7182F430F24}"/>
@@ -49767,9 +49775,8 @@
               </a:ext>
             </a:extLst>
           </a:blip>
-          <a:stretch>
-            <a:fillRect/>
-          </a:stretch>
+          <a:srcRect/>
+          <a:stretch/>
         </p:blipFill>
         <p:spPr>
           <a:xfrm>
@@ -53215,17 +53222,6 @@
 </file>
 
 <file path=customXml/item2.xml><?xml version="1.0" encoding="utf-8"?>
-<p:properties xmlns:p="http://schemas.microsoft.com/office/2006/metadata/properties" xmlns:xsi="http://www.w3.org/2001/XMLSchema-instance" xmlns:pc="http://schemas.microsoft.com/office/infopath/2007/PartnerControls">
-  <documentManagement>
-    <lcf76f155ced4ddcb4097134ff3c332f xmlns="f48e0371-e5a1-4434-9921-99c130702a89">
-      <Terms xmlns="http://schemas.microsoft.com/office/infopath/2007/PartnerControls"/>
-    </lcf76f155ced4ddcb4097134ff3c332f>
-    <TaxCatchAll xmlns="f1524577-e775-4792-9e02-59d88675d35f" xsi:nil="true"/>
-  </documentManagement>
-</p:properties>
-</file>
-
-<file path=customXml/item3.xml><?xml version="1.0" encoding="utf-8"?>
 <ct:contentTypeSchema xmlns:ct="http://schemas.microsoft.com/office/2006/metadata/contentType" xmlns:ma="http://schemas.microsoft.com/office/2006/metadata/properties/metaAttributes" ct:_="" ma:_="" ma:contentTypeName="Document" ma:contentTypeID="0x010100A9CE1C22E302D54A92E3B27F42531170" ma:contentTypeVersion="18" ma:contentTypeDescription="Create a new document." ma:contentTypeScope="" ma:versionID="e7baf0caf837d1a6ee69fbbb52e60e83">
   <xsd:schema xmlns:xsd="http://www.w3.org/2001/XMLSchema" xmlns:xs="http://www.w3.org/2001/XMLSchema" xmlns:p="http://schemas.microsoft.com/office/2006/metadata/properties" xmlns:ns2="f48e0371-e5a1-4434-9921-99c130702a89" xmlns:ns3="f1524577-e775-4792-9e02-59d88675d35f" targetNamespace="http://schemas.microsoft.com/office/2006/metadata/properties" ma:root="true" ma:fieldsID="c393747ab2179622d80a78a13a0c22e4" ns2:_="" ns3:_="">
     <xsd:import namespace="f48e0371-e5a1-4434-9921-99c130702a89"/>
@@ -53480,6 +53476,17 @@
 </ct:contentTypeSchema>
 </file>
 
+<file path=customXml/item3.xml><?xml version="1.0" encoding="utf-8"?>
+<p:properties xmlns:p="http://schemas.microsoft.com/office/2006/metadata/properties" xmlns:xsi="http://www.w3.org/2001/XMLSchema-instance" xmlns:pc="http://schemas.microsoft.com/office/infopath/2007/PartnerControls">
+  <documentManagement>
+    <lcf76f155ced4ddcb4097134ff3c332f xmlns="f48e0371-e5a1-4434-9921-99c130702a89">
+      <Terms xmlns="http://schemas.microsoft.com/office/infopath/2007/PartnerControls"/>
+    </lcf76f155ced4ddcb4097134ff3c332f>
+    <TaxCatchAll xmlns="f1524577-e775-4792-9e02-59d88675d35f" xsi:nil="true"/>
+  </documentManagement>
+</p:properties>
+</file>
+
 <file path=customXml/itemProps1.xml><?xml version="1.0" encoding="utf-8"?>
 <ds:datastoreItem xmlns:ds="http://schemas.openxmlformats.org/officeDocument/2006/customXml" ds:itemID="{4555E040-F903-4557-B5BA-FEEA81916D11}">
   <ds:schemaRefs>
@@ -53489,23 +53496,6 @@
 </file>
 
 <file path=customXml/itemProps2.xml><?xml version="1.0" encoding="utf-8"?>
-<ds:datastoreItem xmlns:ds="http://schemas.openxmlformats.org/officeDocument/2006/customXml" ds:itemID="{E63F9314-2156-4A26-9C7B-3A436590D2E6}">
-  <ds:schemaRefs>
-    <ds:schemaRef ds:uri="http://schemas.microsoft.com/office/2006/documentManagement/types"/>
-    <ds:schemaRef ds:uri="http://www.w3.org/XML/1998/namespace"/>
-    <ds:schemaRef ds:uri="http://schemas.microsoft.com/office/2006/metadata/properties"/>
-    <ds:schemaRef ds:uri="http://purl.org/dc/elements/1.1/"/>
-    <ds:schemaRef ds:uri="http://schemas.openxmlformats.org/package/2006/metadata/core-properties"/>
-    <ds:schemaRef ds:uri="http://purl.org/dc/terms/"/>
-    <ds:schemaRef ds:uri="http://schemas.microsoft.com/office/infopath/2007/PartnerControls"/>
-    <ds:schemaRef ds:uri="f1524577-e775-4792-9e02-59d88675d35f"/>
-    <ds:schemaRef ds:uri="f48e0371-e5a1-4434-9921-99c130702a89"/>
-    <ds:schemaRef ds:uri="http://purl.org/dc/dcmitype/"/>
-  </ds:schemaRefs>
-</ds:datastoreItem>
-</file>
-
-<file path=customXml/itemProps3.xml><?xml version="1.0" encoding="utf-8"?>
 <ds:datastoreItem xmlns:ds="http://schemas.openxmlformats.org/officeDocument/2006/customXml" ds:itemID="{47B0B96C-27C4-4CB7-95AA-6F7118EE0252}">
   <ds:schemaRefs>
     <ds:schemaRef ds:uri="http://schemas.microsoft.com/office/2006/metadata/contentType"/>
@@ -53522,4 +53512,21 @@
     <ds:schemaRef ds:uri="http://schemas.microsoft.com/internal/obd"/>
   </ds:schemaRefs>
 </ds:datastoreItem>
+</file>
+
+<file path=customXml/itemProps3.xml><?xml version="1.0" encoding="utf-8"?>
+<ds:datastoreItem xmlns:ds="http://schemas.openxmlformats.org/officeDocument/2006/customXml" ds:itemID="{E63F9314-2156-4A26-9C7B-3A436590D2E6}">
+  <ds:schemaRefs>
+    <ds:schemaRef ds:uri="http://schemas.microsoft.com/office/2006/documentManagement/types"/>
+    <ds:schemaRef ds:uri="http://www.w3.org/XML/1998/namespace"/>
+    <ds:schemaRef ds:uri="http://schemas.microsoft.com/office/2006/metadata/properties"/>
+    <ds:schemaRef ds:uri="http://purl.org/dc/elements/1.1/"/>
+    <ds:schemaRef ds:uri="http://schemas.openxmlformats.org/package/2006/metadata/core-properties"/>
+    <ds:schemaRef ds:uri="http://purl.org/dc/terms/"/>
+    <ds:schemaRef ds:uri="http://schemas.microsoft.com/office/infopath/2007/PartnerControls"/>
+    <ds:schemaRef ds:uri="f1524577-e775-4792-9e02-59d88675d35f"/>
+    <ds:schemaRef ds:uri="f48e0371-e5a1-4434-9921-99c130702a89"/>
+    <ds:schemaRef ds:uri="http://purl.org/dc/dcmitype/"/>
+  </ds:schemaRefs>
+</ds:datastoreItem>
 </file>
</xml_diff>

<commit_message>
Homework Upload Page Update
Added No Robots Text.
</commit_message>
<xml_diff>
--- a/materials/BEA_EdMeasurement and Item Development_Day4.pptx
+++ b/materials/BEA_EdMeasurement and Item Development_Day4.pptx
@@ -8,31 +8,32 @@
     <p:sldMasterId id="2147483713" r:id="rId7"/>
   </p:sldMasterIdLst>
   <p:notesMasterIdLst>
-    <p:notesMasterId r:id="rId30"/>
+    <p:notesMasterId r:id="rId31"/>
   </p:notesMasterIdLst>
   <p:sldIdLst>
     <p:sldId id="861" r:id="rId8"/>
     <p:sldId id="879" r:id="rId9"/>
     <p:sldId id="304" r:id="rId10"/>
-    <p:sldId id="860" r:id="rId11"/>
-    <p:sldId id="867" r:id="rId12"/>
-    <p:sldId id="858" r:id="rId13"/>
-    <p:sldId id="859" r:id="rId14"/>
-    <p:sldId id="869" r:id="rId15"/>
-    <p:sldId id="870" r:id="rId16"/>
-    <p:sldId id="871" r:id="rId17"/>
-    <p:sldId id="872" r:id="rId18"/>
-    <p:sldId id="873" r:id="rId19"/>
-    <p:sldId id="863" r:id="rId20"/>
-    <p:sldId id="866" r:id="rId21"/>
-    <p:sldId id="864" r:id="rId22"/>
-    <p:sldId id="868" r:id="rId23"/>
-    <p:sldId id="877" r:id="rId24"/>
-    <p:sldId id="865" r:id="rId25"/>
-    <p:sldId id="875" r:id="rId26"/>
-    <p:sldId id="828" r:id="rId27"/>
-    <p:sldId id="876" r:id="rId28"/>
-    <p:sldId id="874" r:id="rId29"/>
+    <p:sldId id="880" r:id="rId11"/>
+    <p:sldId id="860" r:id="rId12"/>
+    <p:sldId id="867" r:id="rId13"/>
+    <p:sldId id="858" r:id="rId14"/>
+    <p:sldId id="859" r:id="rId15"/>
+    <p:sldId id="869" r:id="rId16"/>
+    <p:sldId id="870" r:id="rId17"/>
+    <p:sldId id="871" r:id="rId18"/>
+    <p:sldId id="872" r:id="rId19"/>
+    <p:sldId id="873" r:id="rId20"/>
+    <p:sldId id="863" r:id="rId21"/>
+    <p:sldId id="866" r:id="rId22"/>
+    <p:sldId id="864" r:id="rId23"/>
+    <p:sldId id="868" r:id="rId24"/>
+    <p:sldId id="877" r:id="rId25"/>
+    <p:sldId id="865" r:id="rId26"/>
+    <p:sldId id="875" r:id="rId27"/>
+    <p:sldId id="828" r:id="rId28"/>
+    <p:sldId id="876" r:id="rId29"/>
+    <p:sldId id="874" r:id="rId30"/>
   </p:sldIdLst>
   <p:sldSz cx="12192000" cy="6858000"/>
   <p:notesSz cx="6858000" cy="9144000"/>
@@ -149,6 +150,173 @@
 
 <file path=ppt/changesInfos/changesInfo1.xml><?xml version="1.0" encoding="utf-8"?>
 <pc:chgInfo xmlns:a="http://schemas.openxmlformats.org/drawingml/2006/main" xmlns:r="http://schemas.openxmlformats.org/officeDocument/2006/relationships" xmlns:ac="http://schemas.microsoft.com/office/drawing/2013/main/command" xmlns:pc="http://schemas.microsoft.com/office/powerpoint/2013/main/command">
+  <pc:docChgLst>
+    <pc:chgData name="REINERTSEN Nate, EDU/SBS" userId="9179661c-9943-48ce-aed0-0d18650acacf" providerId="ADAL" clId="{7EE3BD91-EE23-42B0-AAE2-8DDD4582273F}"/>
+    <pc:docChg chg="custSel addSld modSld">
+      <pc:chgData name="REINERTSEN Nate, EDU/SBS" userId="9179661c-9943-48ce-aed0-0d18650acacf" providerId="ADAL" clId="{7EE3BD91-EE23-42B0-AAE2-8DDD4582273F}" dt="2024-03-14T10:23:55.316" v="643" actId="255"/>
+      <pc:docMkLst>
+        <pc:docMk/>
+      </pc:docMkLst>
+      <pc:sldChg chg="addSp delSp modSp mod modClrScheme chgLayout">
+        <pc:chgData name="REINERTSEN Nate, EDU/SBS" userId="9179661c-9943-48ce-aed0-0d18650acacf" providerId="ADAL" clId="{7EE3BD91-EE23-42B0-AAE2-8DDD4582273F}" dt="2024-03-14T10:16:04.626" v="20" actId="20577"/>
+        <pc:sldMkLst>
+          <pc:docMk/>
+          <pc:sldMk cId="527131482" sldId="874"/>
+        </pc:sldMkLst>
+        <pc:spChg chg="add mod ord">
+          <ac:chgData name="REINERTSEN Nate, EDU/SBS" userId="9179661c-9943-48ce-aed0-0d18650acacf" providerId="ADAL" clId="{7EE3BD91-EE23-42B0-AAE2-8DDD4582273F}" dt="2024-03-14T10:16:04.626" v="20" actId="20577"/>
+          <ac:spMkLst>
+            <pc:docMk/>
+            <pc:sldMk cId="527131482" sldId="874"/>
+            <ac:spMk id="2" creationId="{46E627B5-F784-1B38-FEE7-E575CE3D38B5}"/>
+          </ac:spMkLst>
+        </pc:spChg>
+        <pc:spChg chg="del">
+          <ac:chgData name="REINERTSEN Nate, EDU/SBS" userId="9179661c-9943-48ce-aed0-0d18650acacf" providerId="ADAL" clId="{7EE3BD91-EE23-42B0-AAE2-8DDD4582273F}" dt="2024-03-14T10:15:58.978" v="1" actId="700"/>
+          <ac:spMkLst>
+            <pc:docMk/>
+            <pc:sldMk cId="527131482" sldId="874"/>
+            <ac:spMk id="4" creationId="{C72DCD06-D272-934B-844C-49CAA8C73196}"/>
+          </ac:spMkLst>
+        </pc:spChg>
+        <pc:spChg chg="del mod ord">
+          <ac:chgData name="REINERTSEN Nate, EDU/SBS" userId="9179661c-9943-48ce-aed0-0d18650acacf" providerId="ADAL" clId="{7EE3BD91-EE23-42B0-AAE2-8DDD4582273F}" dt="2024-03-14T10:15:58.978" v="1" actId="700"/>
+          <ac:spMkLst>
+            <pc:docMk/>
+            <pc:sldMk cId="527131482" sldId="874"/>
+            <ac:spMk id="5" creationId="{31A5384B-BE56-E569-ECA1-F8183D55846F}"/>
+          </ac:spMkLst>
+        </pc:spChg>
+      </pc:sldChg>
+      <pc:sldChg chg="addSp delSp modSp add mod">
+        <pc:chgData name="REINERTSEN Nate, EDU/SBS" userId="9179661c-9943-48ce-aed0-0d18650acacf" providerId="ADAL" clId="{7EE3BD91-EE23-42B0-AAE2-8DDD4582273F}" dt="2024-03-14T10:23:55.316" v="643" actId="255"/>
+        <pc:sldMkLst>
+          <pc:docMk/>
+          <pc:sldMk cId="410752877" sldId="875"/>
+        </pc:sldMkLst>
+        <pc:spChg chg="mod">
+          <ac:chgData name="REINERTSEN Nate, EDU/SBS" userId="9179661c-9943-48ce-aed0-0d18650acacf" providerId="ADAL" clId="{7EE3BD91-EE23-42B0-AAE2-8DDD4582273F}" dt="2024-03-14T10:16:11.709" v="27" actId="20577"/>
+          <ac:spMkLst>
+            <pc:docMk/>
+            <pc:sldMk cId="410752877" sldId="875"/>
+            <ac:spMk id="4" creationId="{4BC0FDC2-D636-BEDA-999E-67D2330CD0B7}"/>
+          </ac:spMkLst>
+        </pc:spChg>
+        <pc:spChg chg="mod">
+          <ac:chgData name="REINERTSEN Nate, EDU/SBS" userId="9179661c-9943-48ce-aed0-0d18650acacf" providerId="ADAL" clId="{7EE3BD91-EE23-42B0-AAE2-8DDD4582273F}" dt="2024-03-14T10:16:21.985" v="33" actId="27636"/>
+          <ac:spMkLst>
+            <pc:docMk/>
+            <pc:sldMk cId="410752877" sldId="875"/>
+            <ac:spMk id="14" creationId="{C99344CC-4D5F-A976-33E9-9CDBC86A9C69}"/>
+          </ac:spMkLst>
+        </pc:spChg>
+        <pc:spChg chg="mod">
+          <ac:chgData name="REINERTSEN Nate, EDU/SBS" userId="9179661c-9943-48ce-aed0-0d18650acacf" providerId="ADAL" clId="{7EE3BD91-EE23-42B0-AAE2-8DDD4582273F}" dt="2024-03-14T10:20:43.242" v="303" actId="20577"/>
+          <ac:spMkLst>
+            <pc:docMk/>
+            <pc:sldMk cId="410752877" sldId="875"/>
+            <ac:spMk id="15" creationId="{6799B0A9-A1F1-A73C-7A68-A479117F5C8C}"/>
+          </ac:spMkLst>
+        </pc:spChg>
+        <pc:spChg chg="mod">
+          <ac:chgData name="REINERTSEN Nate, EDU/SBS" userId="9179661c-9943-48ce-aed0-0d18650acacf" providerId="ADAL" clId="{7EE3BD91-EE23-42B0-AAE2-8DDD4582273F}" dt="2024-03-14T10:16:34.192" v="41" actId="27636"/>
+          <ac:spMkLst>
+            <pc:docMk/>
+            <pc:sldMk cId="410752877" sldId="875"/>
+            <ac:spMk id="16" creationId="{1C0C61E1-6C3C-DB93-A8CF-9377B9498540}"/>
+          </ac:spMkLst>
+        </pc:spChg>
+        <pc:spChg chg="mod">
+          <ac:chgData name="REINERTSEN Nate, EDU/SBS" userId="9179661c-9943-48ce-aed0-0d18650acacf" providerId="ADAL" clId="{7EE3BD91-EE23-42B0-AAE2-8DDD4582273F}" dt="2024-03-14T10:21:09.911" v="348" actId="20577"/>
+          <ac:spMkLst>
+            <pc:docMk/>
+            <pc:sldMk cId="410752877" sldId="875"/>
+            <ac:spMk id="17" creationId="{CAD27ED7-4097-6BD0-0AB8-CF7E9CD5ACB6}"/>
+          </ac:spMkLst>
+        </pc:spChg>
+        <pc:spChg chg="mod">
+          <ac:chgData name="REINERTSEN Nate, EDU/SBS" userId="9179661c-9943-48ce-aed0-0d18650acacf" providerId="ADAL" clId="{7EE3BD91-EE23-42B0-AAE2-8DDD4582273F}" dt="2024-03-14T10:16:31.096" v="39" actId="27636"/>
+          <ac:spMkLst>
+            <pc:docMk/>
+            <pc:sldMk cId="410752877" sldId="875"/>
+            <ac:spMk id="18" creationId="{E025917D-CFFE-8182-E123-6BC8B494D2B8}"/>
+          </ac:spMkLst>
+        </pc:spChg>
+        <pc:spChg chg="mod">
+          <ac:chgData name="REINERTSEN Nate, EDU/SBS" userId="9179661c-9943-48ce-aed0-0d18650acacf" providerId="ADAL" clId="{7EE3BD91-EE23-42B0-AAE2-8DDD4582273F}" dt="2024-03-14T10:22:46.905" v="527" actId="20577"/>
+          <ac:spMkLst>
+            <pc:docMk/>
+            <pc:sldMk cId="410752877" sldId="875"/>
+            <ac:spMk id="19" creationId="{2C6DB3CE-994B-F6B8-D7F4-CCAFB7D83B4D}"/>
+          </ac:spMkLst>
+        </pc:spChg>
+        <pc:spChg chg="mod">
+          <ac:chgData name="REINERTSEN Nate, EDU/SBS" userId="9179661c-9943-48ce-aed0-0d18650acacf" providerId="ADAL" clId="{7EE3BD91-EE23-42B0-AAE2-8DDD4582273F}" dt="2024-03-14T10:16:38.717" v="44" actId="27636"/>
+          <ac:spMkLst>
+            <pc:docMk/>
+            <pc:sldMk cId="410752877" sldId="875"/>
+            <ac:spMk id="20" creationId="{BF693A22-4C8C-B657-0484-08BF9A503852}"/>
+          </ac:spMkLst>
+        </pc:spChg>
+        <pc:spChg chg="mod">
+          <ac:chgData name="REINERTSEN Nate, EDU/SBS" userId="9179661c-9943-48ce-aed0-0d18650acacf" providerId="ADAL" clId="{7EE3BD91-EE23-42B0-AAE2-8DDD4582273F}" dt="2024-03-14T10:23:55.316" v="643" actId="255"/>
+          <ac:spMkLst>
+            <pc:docMk/>
+            <pc:sldMk cId="410752877" sldId="875"/>
+            <ac:spMk id="21" creationId="{C684ECC0-9A38-8280-1B8E-C5EED91C17E1}"/>
+          </ac:spMkLst>
+        </pc:spChg>
+        <pc:spChg chg="mod">
+          <ac:chgData name="REINERTSEN Nate, EDU/SBS" userId="9179661c-9943-48ce-aed0-0d18650acacf" providerId="ADAL" clId="{7EE3BD91-EE23-42B0-AAE2-8DDD4582273F}" dt="2024-03-14T10:16:17.323" v="30" actId="27636"/>
+          <ac:spMkLst>
+            <pc:docMk/>
+            <pc:sldMk cId="410752877" sldId="875"/>
+            <ac:spMk id="22" creationId="{69CD641C-5219-D7B0-F2AB-28C2FB7FDF4B}"/>
+          </ac:spMkLst>
+        </pc:spChg>
+        <pc:spChg chg="mod">
+          <ac:chgData name="REINERTSEN Nate, EDU/SBS" userId="9179661c-9943-48ce-aed0-0d18650acacf" providerId="ADAL" clId="{7EE3BD91-EE23-42B0-AAE2-8DDD4582273F}" dt="2024-03-14T10:20:12.859" v="267" actId="20577"/>
+          <ac:spMkLst>
+            <pc:docMk/>
+            <pc:sldMk cId="410752877" sldId="875"/>
+            <ac:spMk id="23" creationId="{3F18EF30-E529-4FFC-FDF3-B1BB1204DCE4}"/>
+          </ac:spMkLst>
+        </pc:spChg>
+        <pc:graphicFrameChg chg="add del mod">
+          <ac:chgData name="REINERTSEN Nate, EDU/SBS" userId="9179661c-9943-48ce-aed0-0d18650acacf" providerId="ADAL" clId="{7EE3BD91-EE23-42B0-AAE2-8DDD4582273F}" dt="2024-03-14T10:18:43.730" v="143"/>
+          <ac:graphicFrameMkLst>
+            <pc:docMk/>
+            <pc:sldMk cId="410752877" sldId="875"/>
+            <ac:graphicFrameMk id="2" creationId="{93CACBE2-A099-B61C-8F17-2D14BF1D8D64}"/>
+          </ac:graphicFrameMkLst>
+        </pc:graphicFrameChg>
+        <pc:graphicFrameChg chg="add del mod">
+          <ac:chgData name="REINERTSEN Nate, EDU/SBS" userId="9179661c-9943-48ce-aed0-0d18650acacf" providerId="ADAL" clId="{7EE3BD91-EE23-42B0-AAE2-8DDD4582273F}" dt="2024-03-14T10:19:19.026" v="159"/>
+          <ac:graphicFrameMkLst>
+            <pc:docMk/>
+            <pc:sldMk cId="410752877" sldId="875"/>
+            <ac:graphicFrameMk id="3" creationId="{802CBFEE-928D-0D36-F879-FD6D626488B4}"/>
+          </ac:graphicFrameMkLst>
+        </pc:graphicFrameChg>
+        <pc:graphicFrameChg chg="add del mod">
+          <ac:chgData name="REINERTSEN Nate, EDU/SBS" userId="9179661c-9943-48ce-aed0-0d18650acacf" providerId="ADAL" clId="{7EE3BD91-EE23-42B0-AAE2-8DDD4582273F}" dt="2024-03-14T10:19:23.360" v="162"/>
+          <ac:graphicFrameMkLst>
+            <pc:docMk/>
+            <pc:sldMk cId="410752877" sldId="875"/>
+            <ac:graphicFrameMk id="5" creationId="{42850E44-C30E-4064-83CC-C59D3D30EE12}"/>
+          </ac:graphicFrameMkLst>
+        </pc:graphicFrameChg>
+        <pc:graphicFrameChg chg="add del mod">
+          <ac:chgData name="REINERTSEN Nate, EDU/SBS" userId="9179661c-9943-48ce-aed0-0d18650acacf" providerId="ADAL" clId="{7EE3BD91-EE23-42B0-AAE2-8DDD4582273F}" dt="2024-03-14T10:19:31.214" v="165" actId="478"/>
+          <ac:graphicFrameMkLst>
+            <pc:docMk/>
+            <pc:sldMk cId="410752877" sldId="875"/>
+            <ac:graphicFrameMk id="6" creationId="{15A0276D-4233-DC6C-D646-92D08342F8D6}"/>
+          </ac:graphicFrameMkLst>
+        </pc:graphicFrameChg>
+      </pc:sldChg>
+    </pc:docChg>
+  </pc:docChgLst>
   <pc:docChgLst>
     <pc:chgData name="REINERTSEN Nate, EDU/SBS" userId="9179661c-9943-48ce-aed0-0d18650acacf" providerId="ADAL" clId="{34060D42-D428-4386-AEA3-96002489D9CD}"/>
     <pc:docChg chg="undo custSel addSld delSld modSld sldOrd">
@@ -2055,173 +2223,6 @@
           </pc:sldLayoutMkLst>
         </pc:sldLayoutChg>
       </pc:sldMasterChg>
-    </pc:docChg>
-  </pc:docChgLst>
-  <pc:docChgLst>
-    <pc:chgData name="REINERTSEN Nate, EDU/SBS" userId="9179661c-9943-48ce-aed0-0d18650acacf" providerId="ADAL" clId="{7EE3BD91-EE23-42B0-AAE2-8DDD4582273F}"/>
-    <pc:docChg chg="custSel addSld modSld">
-      <pc:chgData name="REINERTSEN Nate, EDU/SBS" userId="9179661c-9943-48ce-aed0-0d18650acacf" providerId="ADAL" clId="{7EE3BD91-EE23-42B0-AAE2-8DDD4582273F}" dt="2024-03-14T10:23:55.316" v="643" actId="255"/>
-      <pc:docMkLst>
-        <pc:docMk/>
-      </pc:docMkLst>
-      <pc:sldChg chg="addSp delSp modSp mod modClrScheme chgLayout">
-        <pc:chgData name="REINERTSEN Nate, EDU/SBS" userId="9179661c-9943-48ce-aed0-0d18650acacf" providerId="ADAL" clId="{7EE3BD91-EE23-42B0-AAE2-8DDD4582273F}" dt="2024-03-14T10:16:04.626" v="20" actId="20577"/>
-        <pc:sldMkLst>
-          <pc:docMk/>
-          <pc:sldMk cId="527131482" sldId="874"/>
-        </pc:sldMkLst>
-        <pc:spChg chg="add mod ord">
-          <ac:chgData name="REINERTSEN Nate, EDU/SBS" userId="9179661c-9943-48ce-aed0-0d18650acacf" providerId="ADAL" clId="{7EE3BD91-EE23-42B0-AAE2-8DDD4582273F}" dt="2024-03-14T10:16:04.626" v="20" actId="20577"/>
-          <ac:spMkLst>
-            <pc:docMk/>
-            <pc:sldMk cId="527131482" sldId="874"/>
-            <ac:spMk id="2" creationId="{46E627B5-F784-1B38-FEE7-E575CE3D38B5}"/>
-          </ac:spMkLst>
-        </pc:spChg>
-        <pc:spChg chg="del">
-          <ac:chgData name="REINERTSEN Nate, EDU/SBS" userId="9179661c-9943-48ce-aed0-0d18650acacf" providerId="ADAL" clId="{7EE3BD91-EE23-42B0-AAE2-8DDD4582273F}" dt="2024-03-14T10:15:58.978" v="1" actId="700"/>
-          <ac:spMkLst>
-            <pc:docMk/>
-            <pc:sldMk cId="527131482" sldId="874"/>
-            <ac:spMk id="4" creationId="{C72DCD06-D272-934B-844C-49CAA8C73196}"/>
-          </ac:spMkLst>
-        </pc:spChg>
-        <pc:spChg chg="del mod ord">
-          <ac:chgData name="REINERTSEN Nate, EDU/SBS" userId="9179661c-9943-48ce-aed0-0d18650acacf" providerId="ADAL" clId="{7EE3BD91-EE23-42B0-AAE2-8DDD4582273F}" dt="2024-03-14T10:15:58.978" v="1" actId="700"/>
-          <ac:spMkLst>
-            <pc:docMk/>
-            <pc:sldMk cId="527131482" sldId="874"/>
-            <ac:spMk id="5" creationId="{31A5384B-BE56-E569-ECA1-F8183D55846F}"/>
-          </ac:spMkLst>
-        </pc:spChg>
-      </pc:sldChg>
-      <pc:sldChg chg="addSp delSp modSp add mod">
-        <pc:chgData name="REINERTSEN Nate, EDU/SBS" userId="9179661c-9943-48ce-aed0-0d18650acacf" providerId="ADAL" clId="{7EE3BD91-EE23-42B0-AAE2-8DDD4582273F}" dt="2024-03-14T10:23:55.316" v="643" actId="255"/>
-        <pc:sldMkLst>
-          <pc:docMk/>
-          <pc:sldMk cId="410752877" sldId="875"/>
-        </pc:sldMkLst>
-        <pc:spChg chg="mod">
-          <ac:chgData name="REINERTSEN Nate, EDU/SBS" userId="9179661c-9943-48ce-aed0-0d18650acacf" providerId="ADAL" clId="{7EE3BD91-EE23-42B0-AAE2-8DDD4582273F}" dt="2024-03-14T10:16:11.709" v="27" actId="20577"/>
-          <ac:spMkLst>
-            <pc:docMk/>
-            <pc:sldMk cId="410752877" sldId="875"/>
-            <ac:spMk id="4" creationId="{4BC0FDC2-D636-BEDA-999E-67D2330CD0B7}"/>
-          </ac:spMkLst>
-        </pc:spChg>
-        <pc:spChg chg="mod">
-          <ac:chgData name="REINERTSEN Nate, EDU/SBS" userId="9179661c-9943-48ce-aed0-0d18650acacf" providerId="ADAL" clId="{7EE3BD91-EE23-42B0-AAE2-8DDD4582273F}" dt="2024-03-14T10:16:21.985" v="33" actId="27636"/>
-          <ac:spMkLst>
-            <pc:docMk/>
-            <pc:sldMk cId="410752877" sldId="875"/>
-            <ac:spMk id="14" creationId="{C99344CC-4D5F-A976-33E9-9CDBC86A9C69}"/>
-          </ac:spMkLst>
-        </pc:spChg>
-        <pc:spChg chg="mod">
-          <ac:chgData name="REINERTSEN Nate, EDU/SBS" userId="9179661c-9943-48ce-aed0-0d18650acacf" providerId="ADAL" clId="{7EE3BD91-EE23-42B0-AAE2-8DDD4582273F}" dt="2024-03-14T10:20:43.242" v="303" actId="20577"/>
-          <ac:spMkLst>
-            <pc:docMk/>
-            <pc:sldMk cId="410752877" sldId="875"/>
-            <ac:spMk id="15" creationId="{6799B0A9-A1F1-A73C-7A68-A479117F5C8C}"/>
-          </ac:spMkLst>
-        </pc:spChg>
-        <pc:spChg chg="mod">
-          <ac:chgData name="REINERTSEN Nate, EDU/SBS" userId="9179661c-9943-48ce-aed0-0d18650acacf" providerId="ADAL" clId="{7EE3BD91-EE23-42B0-AAE2-8DDD4582273F}" dt="2024-03-14T10:16:34.192" v="41" actId="27636"/>
-          <ac:spMkLst>
-            <pc:docMk/>
-            <pc:sldMk cId="410752877" sldId="875"/>
-            <ac:spMk id="16" creationId="{1C0C61E1-6C3C-DB93-A8CF-9377B9498540}"/>
-          </ac:spMkLst>
-        </pc:spChg>
-        <pc:spChg chg="mod">
-          <ac:chgData name="REINERTSEN Nate, EDU/SBS" userId="9179661c-9943-48ce-aed0-0d18650acacf" providerId="ADAL" clId="{7EE3BD91-EE23-42B0-AAE2-8DDD4582273F}" dt="2024-03-14T10:21:09.911" v="348" actId="20577"/>
-          <ac:spMkLst>
-            <pc:docMk/>
-            <pc:sldMk cId="410752877" sldId="875"/>
-            <ac:spMk id="17" creationId="{CAD27ED7-4097-6BD0-0AB8-CF7E9CD5ACB6}"/>
-          </ac:spMkLst>
-        </pc:spChg>
-        <pc:spChg chg="mod">
-          <ac:chgData name="REINERTSEN Nate, EDU/SBS" userId="9179661c-9943-48ce-aed0-0d18650acacf" providerId="ADAL" clId="{7EE3BD91-EE23-42B0-AAE2-8DDD4582273F}" dt="2024-03-14T10:16:31.096" v="39" actId="27636"/>
-          <ac:spMkLst>
-            <pc:docMk/>
-            <pc:sldMk cId="410752877" sldId="875"/>
-            <ac:spMk id="18" creationId="{E025917D-CFFE-8182-E123-6BC8B494D2B8}"/>
-          </ac:spMkLst>
-        </pc:spChg>
-        <pc:spChg chg="mod">
-          <ac:chgData name="REINERTSEN Nate, EDU/SBS" userId="9179661c-9943-48ce-aed0-0d18650acacf" providerId="ADAL" clId="{7EE3BD91-EE23-42B0-AAE2-8DDD4582273F}" dt="2024-03-14T10:22:46.905" v="527" actId="20577"/>
-          <ac:spMkLst>
-            <pc:docMk/>
-            <pc:sldMk cId="410752877" sldId="875"/>
-            <ac:spMk id="19" creationId="{2C6DB3CE-994B-F6B8-D7F4-CCAFB7D83B4D}"/>
-          </ac:spMkLst>
-        </pc:spChg>
-        <pc:spChg chg="mod">
-          <ac:chgData name="REINERTSEN Nate, EDU/SBS" userId="9179661c-9943-48ce-aed0-0d18650acacf" providerId="ADAL" clId="{7EE3BD91-EE23-42B0-AAE2-8DDD4582273F}" dt="2024-03-14T10:16:38.717" v="44" actId="27636"/>
-          <ac:spMkLst>
-            <pc:docMk/>
-            <pc:sldMk cId="410752877" sldId="875"/>
-            <ac:spMk id="20" creationId="{BF693A22-4C8C-B657-0484-08BF9A503852}"/>
-          </ac:spMkLst>
-        </pc:spChg>
-        <pc:spChg chg="mod">
-          <ac:chgData name="REINERTSEN Nate, EDU/SBS" userId="9179661c-9943-48ce-aed0-0d18650acacf" providerId="ADAL" clId="{7EE3BD91-EE23-42B0-AAE2-8DDD4582273F}" dt="2024-03-14T10:23:55.316" v="643" actId="255"/>
-          <ac:spMkLst>
-            <pc:docMk/>
-            <pc:sldMk cId="410752877" sldId="875"/>
-            <ac:spMk id="21" creationId="{C684ECC0-9A38-8280-1B8E-C5EED91C17E1}"/>
-          </ac:spMkLst>
-        </pc:spChg>
-        <pc:spChg chg="mod">
-          <ac:chgData name="REINERTSEN Nate, EDU/SBS" userId="9179661c-9943-48ce-aed0-0d18650acacf" providerId="ADAL" clId="{7EE3BD91-EE23-42B0-AAE2-8DDD4582273F}" dt="2024-03-14T10:16:17.323" v="30" actId="27636"/>
-          <ac:spMkLst>
-            <pc:docMk/>
-            <pc:sldMk cId="410752877" sldId="875"/>
-            <ac:spMk id="22" creationId="{69CD641C-5219-D7B0-F2AB-28C2FB7FDF4B}"/>
-          </ac:spMkLst>
-        </pc:spChg>
-        <pc:spChg chg="mod">
-          <ac:chgData name="REINERTSEN Nate, EDU/SBS" userId="9179661c-9943-48ce-aed0-0d18650acacf" providerId="ADAL" clId="{7EE3BD91-EE23-42B0-AAE2-8DDD4582273F}" dt="2024-03-14T10:20:12.859" v="267" actId="20577"/>
-          <ac:spMkLst>
-            <pc:docMk/>
-            <pc:sldMk cId="410752877" sldId="875"/>
-            <ac:spMk id="23" creationId="{3F18EF30-E529-4FFC-FDF3-B1BB1204DCE4}"/>
-          </ac:spMkLst>
-        </pc:spChg>
-        <pc:graphicFrameChg chg="add del mod">
-          <ac:chgData name="REINERTSEN Nate, EDU/SBS" userId="9179661c-9943-48ce-aed0-0d18650acacf" providerId="ADAL" clId="{7EE3BD91-EE23-42B0-AAE2-8DDD4582273F}" dt="2024-03-14T10:18:43.730" v="143"/>
-          <ac:graphicFrameMkLst>
-            <pc:docMk/>
-            <pc:sldMk cId="410752877" sldId="875"/>
-            <ac:graphicFrameMk id="2" creationId="{93CACBE2-A099-B61C-8F17-2D14BF1D8D64}"/>
-          </ac:graphicFrameMkLst>
-        </pc:graphicFrameChg>
-        <pc:graphicFrameChg chg="add del mod">
-          <ac:chgData name="REINERTSEN Nate, EDU/SBS" userId="9179661c-9943-48ce-aed0-0d18650acacf" providerId="ADAL" clId="{7EE3BD91-EE23-42B0-AAE2-8DDD4582273F}" dt="2024-03-14T10:19:19.026" v="159"/>
-          <ac:graphicFrameMkLst>
-            <pc:docMk/>
-            <pc:sldMk cId="410752877" sldId="875"/>
-            <ac:graphicFrameMk id="3" creationId="{802CBFEE-928D-0D36-F879-FD6D626488B4}"/>
-          </ac:graphicFrameMkLst>
-        </pc:graphicFrameChg>
-        <pc:graphicFrameChg chg="add del mod">
-          <ac:chgData name="REINERTSEN Nate, EDU/SBS" userId="9179661c-9943-48ce-aed0-0d18650acacf" providerId="ADAL" clId="{7EE3BD91-EE23-42B0-AAE2-8DDD4582273F}" dt="2024-03-14T10:19:23.360" v="162"/>
-          <ac:graphicFrameMkLst>
-            <pc:docMk/>
-            <pc:sldMk cId="410752877" sldId="875"/>
-            <ac:graphicFrameMk id="5" creationId="{42850E44-C30E-4064-83CC-C59D3D30EE12}"/>
-          </ac:graphicFrameMkLst>
-        </pc:graphicFrameChg>
-        <pc:graphicFrameChg chg="add del mod">
-          <ac:chgData name="REINERTSEN Nate, EDU/SBS" userId="9179661c-9943-48ce-aed0-0d18650acacf" providerId="ADAL" clId="{7EE3BD91-EE23-42B0-AAE2-8DDD4582273F}" dt="2024-03-14T10:19:31.214" v="165" actId="478"/>
-          <ac:graphicFrameMkLst>
-            <pc:docMk/>
-            <pc:sldMk cId="410752877" sldId="875"/>
-            <ac:graphicFrameMk id="6" creationId="{15A0276D-4233-DC6C-D646-92D08342F8D6}"/>
-          </ac:graphicFrameMkLst>
-        </pc:graphicFrameChg>
-      </pc:sldChg>
     </pc:docChg>
   </pc:docChgLst>
 </pc:chgInfo>
@@ -46958,16 +46959,9 @@
             <p:ph type="body" sz="quarter" idx="14"/>
           </p:nvPr>
         </p:nvSpPr>
-        <p:spPr>
-          <a:xfrm>
-            <a:off x="1022944" y="1675108"/>
-            <a:ext cx="9797423" cy="3507784"/>
-          </a:xfrm>
-        </p:spPr>
+        <p:spPr/>
         <p:txBody>
-          <a:bodyPr>
-            <a:normAutofit/>
-          </a:bodyPr>
+          <a:bodyPr/>
           <a:lstStyle/>
           <a:p>
             <a:pPr marL="0" indent="0">
@@ -46975,32 +46969,48 @@
             </a:pPr>
             <a:r>
               <a:rPr lang="en-GB" dirty="0"/>
-              <a:t>When you are discussing or critiquing another TD’s unit:</a:t>
-            </a:r>
-          </a:p>
-          <a:p>
+              <a:t>Things to try to remember when your unit is under review:</a:t>
+            </a:r>
+          </a:p>
+          <a:p>
+            <a:r>
+              <a:rPr lang="en-GB" b="1" dirty="0"/>
+              <a:t>You are not your work.</a:t>
+            </a:r>
+            <a:endParaRPr lang="en-GB" dirty="0"/>
+          </a:p>
+          <a:p>
+            <a:pPr lvl="1"/>
             <a:r>
               <a:rPr lang="en-GB" dirty="0"/>
-              <a:t>All your comments and questions must be directed to the whole group</a:t>
+              <a:t>Try hard to keep in mind that all critiques are about the unit, not you. </a:t>
             </a:r>
           </a:p>
           <a:p>
             <a:pPr lvl="1"/>
             <a:r>
               <a:rPr lang="en-GB" dirty="0"/>
-              <a:t>Directing your questions directly to the unit writer can feel like an interrogation</a:t>
+              <a:t>They are not judgments about you or your intelligence, experience, capacity, etc.</a:t>
             </a:r>
           </a:p>
           <a:p>
             <a:r>
               <a:rPr lang="en-GB" dirty="0"/>
-              <a:t>Use ‘soft’ questions, inviting everyone to discuss</a:t>
-            </a:r>
-          </a:p>
-          <a:p>
+              <a:t>It is OK to tell the group, at any point:</a:t>
+            </a:r>
+          </a:p>
+          <a:p>
+            <a:pPr lvl="1"/>
             <a:r>
               <a:rPr lang="en-GB" dirty="0"/>
-              <a:t>If you see a problem, offer a solution. That means being well-prepared!!!</a:t>
+              <a:t>“I’m finding this hard. Can we take a break?” </a:t>
+            </a:r>
+          </a:p>
+          <a:p>
+            <a:pPr lvl="1"/>
+            <a:r>
+              <a:rPr lang="en-GB" dirty="0"/>
+              <a:t>“Can we look at another unit and come back to this one later?”</a:t>
             </a:r>
           </a:p>
         </p:txBody>
@@ -47028,6 +47038,132 @@
           <a:p>
             <a:r>
               <a:rPr lang="en-GB" dirty="0"/>
+              <a:t>Critical distance ‘under the spotlight’</a:t>
+            </a:r>
+          </a:p>
+        </p:txBody>
+      </p:sp>
+    </p:spTree>
+    <p:extLst>
+      <p:ext uri="{BB962C8B-B14F-4D97-AF65-F5344CB8AC3E}">
+        <p14:creationId xmlns:p14="http://schemas.microsoft.com/office/powerpoint/2010/main" val="1225007372"/>
+      </p:ext>
+    </p:extLst>
+  </p:cSld>
+  <p:clrMapOvr>
+    <a:overrideClrMapping bg1="lt1" tx1="dk1" bg2="lt2" tx2="dk2" accent1="accent1" accent2="accent2" accent3="accent3" accent4="accent4" accent5="accent5" accent6="accent6" hlink="hlink" folHlink="folHlink"/>
+  </p:clrMapOvr>
+</p:sld>
+</file>
+
+<file path=ppt/slides/slide11.xml><?xml version="1.0" encoding="utf-8"?>
+<p:sld xmlns:a="http://schemas.openxmlformats.org/drawingml/2006/main" xmlns:r="http://schemas.openxmlformats.org/officeDocument/2006/relationships" xmlns:p="http://schemas.openxmlformats.org/presentationml/2006/main">
+  <p:cSld>
+    <p:bg>
+      <p:bgRef idx="1001">
+        <a:schemeClr val="bg1"/>
+      </p:bgRef>
+    </p:bg>
+    <p:spTree>
+      <p:nvGrpSpPr>
+        <p:cNvPr id="1" name=""/>
+        <p:cNvGrpSpPr/>
+        <p:nvPr/>
+      </p:nvGrpSpPr>
+      <p:grpSpPr>
+        <a:xfrm>
+          <a:off x="0" y="0"/>
+          <a:ext cx="0" cy="0"/>
+          <a:chOff x="0" y="0"/>
+          <a:chExt cx="0" cy="0"/>
+        </a:xfrm>
+      </p:grpSpPr>
+      <p:sp>
+        <p:nvSpPr>
+          <p:cNvPr id="2" name="Text Placeholder 1">
+            <a:extLst>
+              <a:ext uri="{FF2B5EF4-FFF2-40B4-BE49-F238E27FC236}">
+                <a16:creationId xmlns:a16="http://schemas.microsoft.com/office/drawing/2014/main" id="{62DF4EC1-2B15-244C-5313-92DF99A8D408}"/>
+              </a:ext>
+            </a:extLst>
+          </p:cNvPr>
+          <p:cNvSpPr>
+            <a:spLocks noGrp="1"/>
+          </p:cNvSpPr>
+          <p:nvPr>
+            <p:ph type="body" sz="quarter" idx="14"/>
+          </p:nvPr>
+        </p:nvSpPr>
+        <p:spPr>
+          <a:xfrm>
+            <a:off x="1022944" y="1675108"/>
+            <a:ext cx="9797423" cy="3507784"/>
+          </a:xfrm>
+        </p:spPr>
+        <p:txBody>
+          <a:bodyPr>
+            <a:normAutofit/>
+          </a:bodyPr>
+          <a:lstStyle/>
+          <a:p>
+            <a:pPr marL="0" indent="0">
+              <a:buNone/>
+            </a:pPr>
+            <a:r>
+              <a:rPr lang="en-GB" dirty="0"/>
+              <a:t>When you are discussing or critiquing another TD’s unit:</a:t>
+            </a:r>
+          </a:p>
+          <a:p>
+            <a:r>
+              <a:rPr lang="en-GB" dirty="0"/>
+              <a:t>All your comments and questions must be directed to the whole group</a:t>
+            </a:r>
+          </a:p>
+          <a:p>
+            <a:pPr lvl="1"/>
+            <a:r>
+              <a:rPr lang="en-GB" dirty="0"/>
+              <a:t>Directing your questions directly to the unit writer can feel like an interrogation</a:t>
+            </a:r>
+          </a:p>
+          <a:p>
+            <a:r>
+              <a:rPr lang="en-GB" dirty="0"/>
+              <a:t>Use ‘soft’ questions, inviting everyone to discuss</a:t>
+            </a:r>
+          </a:p>
+          <a:p>
+            <a:r>
+              <a:rPr lang="en-GB" dirty="0"/>
+              <a:t>If you see a problem, offer a solution. That means being well-prepared!!!</a:t>
+            </a:r>
+          </a:p>
+        </p:txBody>
+      </p:sp>
+      <p:sp>
+        <p:nvSpPr>
+          <p:cNvPr id="3" name="Title 2">
+            <a:extLst>
+              <a:ext uri="{FF2B5EF4-FFF2-40B4-BE49-F238E27FC236}">
+                <a16:creationId xmlns:a16="http://schemas.microsoft.com/office/drawing/2014/main" id="{7FFDCD27-7B34-8F8D-8484-E3888962C329}"/>
+              </a:ext>
+            </a:extLst>
+          </p:cNvPr>
+          <p:cNvSpPr>
+            <a:spLocks noGrp="1"/>
+          </p:cNvSpPr>
+          <p:nvPr>
+            <p:ph type="title"/>
+          </p:nvPr>
+        </p:nvSpPr>
+        <p:spPr/>
+        <p:txBody>
+          <a:bodyPr/>
+          <a:lstStyle/>
+          <a:p>
+            <a:r>
+              <a:rPr lang="en-GB" dirty="0"/>
               <a:t>Critical distance as a reviewer</a:t>
             </a:r>
           </a:p>
@@ -47046,7 +47182,7 @@
 </p:sld>
 </file>
 
-<file path=ppt/slides/slide11.xml><?xml version="1.0" encoding="utf-8"?>
+<file path=ppt/slides/slide12.xml><?xml version="1.0" encoding="utf-8"?>
 <p:sld xmlns:a="http://schemas.openxmlformats.org/drawingml/2006/main" xmlns:r="http://schemas.openxmlformats.org/officeDocument/2006/relationships" xmlns:p="http://schemas.openxmlformats.org/presentationml/2006/main">
   <p:cSld>
     <p:spTree>
@@ -47300,7 +47436,7 @@
 </p:sld>
 </file>
 
-<file path=ppt/slides/slide12.xml><?xml version="1.0" encoding="utf-8"?>
+<file path=ppt/slides/slide13.xml><?xml version="1.0" encoding="utf-8"?>
 <p:sld xmlns:a="http://schemas.openxmlformats.org/drawingml/2006/main" xmlns:r="http://schemas.openxmlformats.org/officeDocument/2006/relationships" xmlns:p="http://schemas.openxmlformats.org/presentationml/2006/main">
   <p:cSld>
     <p:spTree>
@@ -47453,7 +47589,7 @@
 </p:sld>
 </file>
 
-<file path=ppt/slides/slide13.xml><?xml version="1.0" encoding="utf-8"?>
+<file path=ppt/slides/slide14.xml><?xml version="1.0" encoding="utf-8"?>
 <p:sld xmlns:a="http://schemas.openxmlformats.org/drawingml/2006/main" xmlns:r="http://schemas.openxmlformats.org/officeDocument/2006/relationships" xmlns:p="http://schemas.openxmlformats.org/presentationml/2006/main">
   <p:cSld>
     <p:bg>
@@ -47552,7 +47688,7 @@
 </p:sld>
 </file>
 
-<file path=ppt/slides/slide14.xml><?xml version="1.0" encoding="utf-8"?>
+<file path=ppt/slides/slide15.xml><?xml version="1.0" encoding="utf-8"?>
 <p:sld xmlns:a="http://schemas.openxmlformats.org/drawingml/2006/main" xmlns:r="http://schemas.openxmlformats.org/officeDocument/2006/relationships" xmlns:p="http://schemas.openxmlformats.org/presentationml/2006/main">
   <p:cSld>
     <p:bg>
@@ -47970,7 +48106,7 @@
 </p:sld>
 </file>
 
-<file path=ppt/slides/slide15.xml><?xml version="1.0" encoding="utf-8"?>
+<file path=ppt/slides/slide16.xml><?xml version="1.0" encoding="utf-8"?>
 <p:sld xmlns:a="http://schemas.openxmlformats.org/drawingml/2006/main" xmlns:r="http://schemas.openxmlformats.org/officeDocument/2006/relationships" xmlns:p="http://schemas.openxmlformats.org/presentationml/2006/main">
   <p:cSld>
     <p:bg>
@@ -48069,7 +48205,7 @@
 </p:sld>
 </file>
 
-<file path=ppt/slides/slide16.xml><?xml version="1.0" encoding="utf-8"?>
+<file path=ppt/slides/slide17.xml><?xml version="1.0" encoding="utf-8"?>
 <p:sld xmlns:a="http://schemas.openxmlformats.org/drawingml/2006/main" xmlns:r="http://schemas.openxmlformats.org/officeDocument/2006/relationships" xmlns:p="http://schemas.openxmlformats.org/presentationml/2006/main">
   <p:cSld>
     <p:bg>
@@ -48268,7 +48404,7 @@
 </p:sld>
 </file>
 
-<file path=ppt/slides/slide17.xml><?xml version="1.0" encoding="utf-8"?>
+<file path=ppt/slides/slide18.xml><?xml version="1.0" encoding="utf-8"?>
 <p:sld xmlns:a="http://schemas.openxmlformats.org/drawingml/2006/main" xmlns:r="http://schemas.openxmlformats.org/officeDocument/2006/relationships" xmlns:p="http://schemas.openxmlformats.org/presentationml/2006/main">
   <p:cSld>
     <p:bg>
@@ -48413,7 +48549,7 @@
 </p:sld>
 </file>
 
-<file path=ppt/slides/slide18.xml><?xml version="1.0" encoding="utf-8"?>
+<file path=ppt/slides/slide19.xml><?xml version="1.0" encoding="utf-8"?>
 <p:sld xmlns:a="http://schemas.openxmlformats.org/drawingml/2006/main" xmlns:r="http://schemas.openxmlformats.org/officeDocument/2006/relationships" xmlns:p="http://schemas.openxmlformats.org/presentationml/2006/main">
   <p:cSld>
     <p:bg>
@@ -48496,443 +48632,6 @@
     <p:extLst>
       <p:ext uri="{BB962C8B-B14F-4D97-AF65-F5344CB8AC3E}">
         <p14:creationId xmlns:p14="http://schemas.microsoft.com/office/powerpoint/2010/main" val="2901584622"/>
-      </p:ext>
-    </p:extLst>
-  </p:cSld>
-  <p:clrMapOvr>
-    <a:overrideClrMapping bg1="lt1" tx1="dk1" bg2="lt2" tx2="dk2" accent1="accent1" accent2="accent2" accent3="accent3" accent4="accent4" accent5="accent5" accent6="accent6" hlink="hlink" folHlink="folHlink"/>
-  </p:clrMapOvr>
-</p:sld>
-</file>
-
-<file path=ppt/slides/slide19.xml><?xml version="1.0" encoding="utf-8"?>
-<p:sld xmlns:a="http://schemas.openxmlformats.org/drawingml/2006/main" xmlns:r="http://schemas.openxmlformats.org/officeDocument/2006/relationships" xmlns:p="http://schemas.openxmlformats.org/presentationml/2006/main">
-  <p:cSld>
-    <p:bg>
-      <p:bgRef idx="1001">
-        <a:schemeClr val="bg1"/>
-      </p:bgRef>
-    </p:bg>
-    <p:spTree>
-      <p:nvGrpSpPr>
-        <p:cNvPr id="1" name=""/>
-        <p:cNvGrpSpPr/>
-        <p:nvPr/>
-      </p:nvGrpSpPr>
-      <p:grpSpPr>
-        <a:xfrm>
-          <a:off x="0" y="0"/>
-          <a:ext cx="0" cy="0"/>
-          <a:chOff x="0" y="0"/>
-          <a:chExt cx="0" cy="0"/>
-        </a:xfrm>
-      </p:grpSpPr>
-      <p:sp>
-        <p:nvSpPr>
-          <p:cNvPr id="4" name="Title 3">
-            <a:extLst>
-              <a:ext uri="{FF2B5EF4-FFF2-40B4-BE49-F238E27FC236}">
-                <a16:creationId xmlns:a16="http://schemas.microsoft.com/office/drawing/2014/main" id="{4BC0FDC2-D636-BEDA-999E-67D2330CD0B7}"/>
-              </a:ext>
-            </a:extLst>
-          </p:cNvPr>
-          <p:cNvSpPr>
-            <a:spLocks noGrp="1"/>
-          </p:cNvSpPr>
-          <p:nvPr>
-            <p:ph type="title"/>
-          </p:nvPr>
-        </p:nvSpPr>
-        <p:spPr/>
-        <p:txBody>
-          <a:bodyPr/>
-          <a:lstStyle/>
-          <a:p>
-            <a:r>
-              <a:rPr lang="en-GB" dirty="0"/>
-              <a:t>Workshop Recap</a:t>
-            </a:r>
-          </a:p>
-        </p:txBody>
-      </p:sp>
-      <p:sp>
-        <p:nvSpPr>
-          <p:cNvPr id="22" name="Text Placeholder 21">
-            <a:extLst>
-              <a:ext uri="{FF2B5EF4-FFF2-40B4-BE49-F238E27FC236}">
-                <a16:creationId xmlns:a16="http://schemas.microsoft.com/office/drawing/2014/main" id="{69CD641C-5219-D7B0-F2AB-28C2FB7FDF4B}"/>
-              </a:ext>
-            </a:extLst>
-          </p:cNvPr>
-          <p:cNvSpPr>
-            <a:spLocks noGrp="1"/>
-          </p:cNvSpPr>
-          <p:nvPr>
-            <p:ph type="body" sz="quarter" idx="30"/>
-          </p:nvPr>
-        </p:nvSpPr>
-        <p:spPr/>
-        <p:txBody>
-          <a:bodyPr>
-            <a:normAutofit fontScale="92500" lnSpcReduction="20000"/>
-          </a:bodyPr>
-          <a:lstStyle/>
-          <a:p>
-            <a:r>
-              <a:rPr lang="en-GB" dirty="0">
-                <a:solidFill>
-                  <a:srgbClr val="00B0F0"/>
-                </a:solidFill>
-              </a:rPr>
-              <a:t>What is educational measurement?</a:t>
-            </a:r>
-          </a:p>
-        </p:txBody>
-      </p:sp>
-      <p:sp>
-        <p:nvSpPr>
-          <p:cNvPr id="23" name="Text Placeholder 22">
-            <a:extLst>
-              <a:ext uri="{FF2B5EF4-FFF2-40B4-BE49-F238E27FC236}">
-                <a16:creationId xmlns:a16="http://schemas.microsoft.com/office/drawing/2014/main" id="{3F18EF30-E529-4FFC-FDF3-B1BB1204DCE4}"/>
-              </a:ext>
-            </a:extLst>
-          </p:cNvPr>
-          <p:cNvSpPr>
-            <a:spLocks noGrp="1"/>
-          </p:cNvSpPr>
-          <p:nvPr>
-            <p:ph type="body" sz="quarter" idx="31"/>
-          </p:nvPr>
-        </p:nvSpPr>
-        <p:spPr/>
-        <p:txBody>
-          <a:bodyPr>
-            <a:normAutofit fontScale="92500" lnSpcReduction="10000"/>
-          </a:bodyPr>
-          <a:lstStyle/>
-          <a:p>
-            <a:pPr marL="285750" indent="-285750">
-              <a:buFont typeface="Arial" panose="020B0604020202020204" pitchFamily="34" charset="0"/>
-              <a:buChar char="•"/>
-            </a:pPr>
-            <a:r>
-              <a:rPr lang="en-US" sz="1600" dirty="0"/>
-              <a:t>Measurement concepts</a:t>
-            </a:r>
-          </a:p>
-          <a:p>
-            <a:pPr marL="285750" indent="-285750">
-              <a:buFont typeface="Arial" panose="020B0604020202020204" pitchFamily="34" charset="0"/>
-              <a:buChar char="•"/>
-            </a:pPr>
-            <a:r>
-              <a:rPr lang="en-US" sz="1600" dirty="0"/>
-              <a:t>Assessment Frameworks</a:t>
-            </a:r>
-          </a:p>
-          <a:p>
-            <a:pPr marL="285750" indent="-285750">
-              <a:buFont typeface="Arial" panose="020B0604020202020204" pitchFamily="34" charset="0"/>
-              <a:buChar char="•"/>
-            </a:pPr>
-            <a:r>
-              <a:rPr lang="en-US" sz="1600" dirty="0"/>
-              <a:t>Validity</a:t>
-            </a:r>
-          </a:p>
-        </p:txBody>
-      </p:sp>
-      <p:sp>
-        <p:nvSpPr>
-          <p:cNvPr id="14" name="Text Placeholder 13">
-            <a:extLst>
-              <a:ext uri="{FF2B5EF4-FFF2-40B4-BE49-F238E27FC236}">
-                <a16:creationId xmlns:a16="http://schemas.microsoft.com/office/drawing/2014/main" id="{C99344CC-4D5F-A976-33E9-9CDBC86A9C69}"/>
-              </a:ext>
-            </a:extLst>
-          </p:cNvPr>
-          <p:cNvSpPr>
-            <a:spLocks noGrp="1"/>
-          </p:cNvSpPr>
-          <p:nvPr>
-            <p:ph type="body" sz="quarter" idx="17"/>
-          </p:nvPr>
-        </p:nvSpPr>
-        <p:spPr/>
-        <p:txBody>
-          <a:bodyPr>
-            <a:normAutofit fontScale="92500" lnSpcReduction="20000"/>
-          </a:bodyPr>
-          <a:lstStyle/>
-          <a:p>
-            <a:r>
-              <a:rPr lang="en-GB" dirty="0"/>
-              <a:t>Item Development Principles</a:t>
-            </a:r>
-          </a:p>
-        </p:txBody>
-      </p:sp>
-      <p:sp>
-        <p:nvSpPr>
-          <p:cNvPr id="15" name="Text Placeholder 14">
-            <a:extLst>
-              <a:ext uri="{FF2B5EF4-FFF2-40B4-BE49-F238E27FC236}">
-                <a16:creationId xmlns:a16="http://schemas.microsoft.com/office/drawing/2014/main" id="{6799B0A9-A1F1-A73C-7A68-A479117F5C8C}"/>
-              </a:ext>
-            </a:extLst>
-          </p:cNvPr>
-          <p:cNvSpPr>
-            <a:spLocks noGrp="1"/>
-          </p:cNvSpPr>
-          <p:nvPr>
-            <p:ph type="body" sz="quarter" idx="20"/>
-          </p:nvPr>
-        </p:nvSpPr>
-        <p:spPr/>
-        <p:txBody>
-          <a:bodyPr>
-            <a:normAutofit/>
-          </a:bodyPr>
-          <a:lstStyle/>
-          <a:p>
-            <a:pPr marL="285750" indent="-285750">
-              <a:buFont typeface="Arial" panose="020B0604020202020204" pitchFamily="34" charset="0"/>
-              <a:buChar char="•"/>
-            </a:pPr>
-            <a:r>
-              <a:rPr lang="en-GB" dirty="0"/>
-              <a:t>MC and CR items</a:t>
-            </a:r>
-          </a:p>
-          <a:p>
-            <a:pPr marL="285750" indent="-285750">
-              <a:buFont typeface="Arial" panose="020B0604020202020204" pitchFamily="34" charset="0"/>
-              <a:buChar char="•"/>
-            </a:pPr>
-            <a:r>
-              <a:rPr lang="en-GB" dirty="0"/>
-              <a:t>Using AI in the development process </a:t>
-            </a:r>
-          </a:p>
-        </p:txBody>
-      </p:sp>
-      <p:sp>
-        <p:nvSpPr>
-          <p:cNvPr id="16" name="Text Placeholder 15">
-            <a:extLst>
-              <a:ext uri="{FF2B5EF4-FFF2-40B4-BE49-F238E27FC236}">
-                <a16:creationId xmlns:a16="http://schemas.microsoft.com/office/drawing/2014/main" id="{1C0C61E1-6C3C-DB93-A8CF-9377B9498540}"/>
-              </a:ext>
-            </a:extLst>
-          </p:cNvPr>
-          <p:cNvSpPr>
-            <a:spLocks noGrp="1"/>
-          </p:cNvSpPr>
-          <p:nvPr>
-            <p:ph type="body" sz="quarter" idx="21"/>
-          </p:nvPr>
-        </p:nvSpPr>
-        <p:spPr/>
-        <p:txBody>
-          <a:bodyPr>
-            <a:normAutofit/>
-          </a:bodyPr>
-          <a:lstStyle/>
-          <a:p>
-            <a:r>
-              <a:rPr lang="en-GB" dirty="0"/>
-              <a:t>Item evaluation</a:t>
-            </a:r>
-          </a:p>
-        </p:txBody>
-      </p:sp>
-      <p:sp>
-        <p:nvSpPr>
-          <p:cNvPr id="17" name="Text Placeholder 16">
-            <a:extLst>
-              <a:ext uri="{FF2B5EF4-FFF2-40B4-BE49-F238E27FC236}">
-                <a16:creationId xmlns:a16="http://schemas.microsoft.com/office/drawing/2014/main" id="{CAD27ED7-4097-6BD0-0AB8-CF7E9CD5ACB6}"/>
-              </a:ext>
-            </a:extLst>
-          </p:cNvPr>
-          <p:cNvSpPr>
-            <a:spLocks noGrp="1"/>
-          </p:cNvSpPr>
-          <p:nvPr>
-            <p:ph type="body" sz="quarter" idx="22"/>
-          </p:nvPr>
-        </p:nvSpPr>
-        <p:spPr/>
-        <p:txBody>
-          <a:bodyPr>
-            <a:normAutofit/>
-          </a:bodyPr>
-          <a:lstStyle/>
-          <a:p>
-            <a:pPr marL="285750" indent="-285750">
-              <a:buFont typeface="Arial" panose="020B0604020202020204" pitchFamily="34" charset="0"/>
-              <a:buChar char="•"/>
-            </a:pPr>
-            <a:r>
-              <a:rPr lang="en-GB" dirty="0"/>
-              <a:t>CTT</a:t>
-            </a:r>
-          </a:p>
-          <a:p>
-            <a:pPr marL="285750" indent="-285750">
-              <a:buFont typeface="Arial" panose="020B0604020202020204" pitchFamily="34" charset="0"/>
-              <a:buChar char="•"/>
-            </a:pPr>
-            <a:r>
-              <a:rPr lang="en-GB" dirty="0"/>
-              <a:t>Rasch Measurement/IRT</a:t>
-            </a:r>
-          </a:p>
-        </p:txBody>
-      </p:sp>
-      <p:sp>
-        <p:nvSpPr>
-          <p:cNvPr id="18" name="Text Placeholder 17">
-            <a:extLst>
-              <a:ext uri="{FF2B5EF4-FFF2-40B4-BE49-F238E27FC236}">
-                <a16:creationId xmlns:a16="http://schemas.microsoft.com/office/drawing/2014/main" id="{E025917D-CFFE-8182-E123-6BC8B494D2B8}"/>
-              </a:ext>
-            </a:extLst>
-          </p:cNvPr>
-          <p:cNvSpPr>
-            <a:spLocks noGrp="1"/>
-          </p:cNvSpPr>
-          <p:nvPr>
-            <p:ph type="body" sz="quarter" idx="23"/>
-          </p:nvPr>
-        </p:nvSpPr>
-        <p:spPr/>
-        <p:txBody>
-          <a:bodyPr>
-            <a:normAutofit fontScale="85000" lnSpcReduction="10000"/>
-          </a:bodyPr>
-          <a:lstStyle/>
-          <a:p>
-            <a:r>
-              <a:rPr lang="en-GB" dirty="0"/>
-              <a:t>Test construction and test evaluation</a:t>
-            </a:r>
-          </a:p>
-        </p:txBody>
-      </p:sp>
-      <p:sp>
-        <p:nvSpPr>
-          <p:cNvPr id="19" name="Text Placeholder 18">
-            <a:extLst>
-              <a:ext uri="{FF2B5EF4-FFF2-40B4-BE49-F238E27FC236}">
-                <a16:creationId xmlns:a16="http://schemas.microsoft.com/office/drawing/2014/main" id="{2C6DB3CE-994B-F6B8-D7F4-CCAFB7D83B4D}"/>
-              </a:ext>
-            </a:extLst>
-          </p:cNvPr>
-          <p:cNvSpPr>
-            <a:spLocks noGrp="1"/>
-          </p:cNvSpPr>
-          <p:nvPr>
-            <p:ph type="body" sz="quarter" idx="24"/>
-          </p:nvPr>
-        </p:nvSpPr>
-        <p:spPr/>
-        <p:txBody>
-          <a:bodyPr>
-            <a:normAutofit/>
-          </a:bodyPr>
-          <a:lstStyle/>
-          <a:p>
-            <a:pPr marL="285750" indent="-285750">
-              <a:buFont typeface="Arial" panose="020B0604020202020204" pitchFamily="34" charset="0"/>
-              <a:buChar char="•"/>
-            </a:pPr>
-            <a:r>
-              <a:rPr lang="en-GB" dirty="0"/>
-              <a:t>Booklet designs </a:t>
-            </a:r>
-          </a:p>
-          <a:p>
-            <a:pPr marL="285750" indent="-285750">
-              <a:buFont typeface="Arial" panose="020B0604020202020204" pitchFamily="34" charset="0"/>
-              <a:buChar char="•"/>
-            </a:pPr>
-            <a:r>
-              <a:rPr lang="en-GB" dirty="0"/>
-              <a:t>Test equating</a:t>
-            </a:r>
-          </a:p>
-        </p:txBody>
-      </p:sp>
-      <p:sp>
-        <p:nvSpPr>
-          <p:cNvPr id="20" name="Text Placeholder 19">
-            <a:extLst>
-              <a:ext uri="{FF2B5EF4-FFF2-40B4-BE49-F238E27FC236}">
-                <a16:creationId xmlns:a16="http://schemas.microsoft.com/office/drawing/2014/main" id="{BF693A22-4C8C-B657-0484-08BF9A503852}"/>
-              </a:ext>
-            </a:extLst>
-          </p:cNvPr>
-          <p:cNvSpPr>
-            <a:spLocks noGrp="1"/>
-          </p:cNvSpPr>
-          <p:nvPr>
-            <p:ph type="body" sz="quarter" idx="25"/>
-          </p:nvPr>
-        </p:nvSpPr>
-        <p:spPr/>
-        <p:txBody>
-          <a:bodyPr>
-            <a:normAutofit fontScale="77500" lnSpcReduction="20000"/>
-          </a:bodyPr>
-          <a:lstStyle/>
-          <a:p>
-            <a:r>
-              <a:rPr lang="en-GB" dirty="0"/>
-              <a:t>Cognitive Walkthroughs in Item Development</a:t>
-            </a:r>
-          </a:p>
-        </p:txBody>
-      </p:sp>
-      <p:sp>
-        <p:nvSpPr>
-          <p:cNvPr id="21" name="Text Placeholder 20">
-            <a:extLst>
-              <a:ext uri="{FF2B5EF4-FFF2-40B4-BE49-F238E27FC236}">
-                <a16:creationId xmlns:a16="http://schemas.microsoft.com/office/drawing/2014/main" id="{C684ECC0-9A38-8280-1B8E-C5EED91C17E1}"/>
-              </a:ext>
-            </a:extLst>
-          </p:cNvPr>
-          <p:cNvSpPr>
-            <a:spLocks noGrp="1"/>
-          </p:cNvSpPr>
-          <p:nvPr>
-            <p:ph type="body" sz="quarter" idx="26"/>
-          </p:nvPr>
-        </p:nvSpPr>
-        <p:spPr/>
-        <p:txBody>
-          <a:bodyPr>
-            <a:normAutofit/>
-          </a:bodyPr>
-          <a:lstStyle/>
-          <a:p>
-            <a:pPr marL="285750" indent="-285750">
-              <a:buFont typeface="Arial" panose="020B0604020202020204" pitchFamily="34" charset="0"/>
-              <a:buChar char="•"/>
-            </a:pPr>
-            <a:r>
-              <a:rPr lang="en-GB" dirty="0"/>
-              <a:t>The role and process of collaborative review in item development</a:t>
-            </a:r>
-          </a:p>
-        </p:txBody>
-      </p:sp>
-    </p:spTree>
-    <p:extLst>
-      <p:ext uri="{BB962C8B-B14F-4D97-AF65-F5344CB8AC3E}">
-        <p14:creationId xmlns:p14="http://schemas.microsoft.com/office/powerpoint/2010/main" val="410752877"/>
       </p:ext>
     </p:extLst>
   </p:cSld>
@@ -49335,6 +49034,443 @@
       </p:grpSpPr>
       <p:sp>
         <p:nvSpPr>
+          <p:cNvPr id="4" name="Title 3">
+            <a:extLst>
+              <a:ext uri="{FF2B5EF4-FFF2-40B4-BE49-F238E27FC236}">
+                <a16:creationId xmlns:a16="http://schemas.microsoft.com/office/drawing/2014/main" id="{4BC0FDC2-D636-BEDA-999E-67D2330CD0B7}"/>
+              </a:ext>
+            </a:extLst>
+          </p:cNvPr>
+          <p:cNvSpPr>
+            <a:spLocks noGrp="1"/>
+          </p:cNvSpPr>
+          <p:nvPr>
+            <p:ph type="title"/>
+          </p:nvPr>
+        </p:nvSpPr>
+        <p:spPr/>
+        <p:txBody>
+          <a:bodyPr/>
+          <a:lstStyle/>
+          <a:p>
+            <a:r>
+              <a:rPr lang="en-GB" dirty="0"/>
+              <a:t>Workshop Recap</a:t>
+            </a:r>
+          </a:p>
+        </p:txBody>
+      </p:sp>
+      <p:sp>
+        <p:nvSpPr>
+          <p:cNvPr id="22" name="Text Placeholder 21">
+            <a:extLst>
+              <a:ext uri="{FF2B5EF4-FFF2-40B4-BE49-F238E27FC236}">
+                <a16:creationId xmlns:a16="http://schemas.microsoft.com/office/drawing/2014/main" id="{69CD641C-5219-D7B0-F2AB-28C2FB7FDF4B}"/>
+              </a:ext>
+            </a:extLst>
+          </p:cNvPr>
+          <p:cNvSpPr>
+            <a:spLocks noGrp="1"/>
+          </p:cNvSpPr>
+          <p:nvPr>
+            <p:ph type="body" sz="quarter" idx="30"/>
+          </p:nvPr>
+        </p:nvSpPr>
+        <p:spPr/>
+        <p:txBody>
+          <a:bodyPr>
+            <a:normAutofit fontScale="92500" lnSpcReduction="20000"/>
+          </a:bodyPr>
+          <a:lstStyle/>
+          <a:p>
+            <a:r>
+              <a:rPr lang="en-GB" dirty="0">
+                <a:solidFill>
+                  <a:srgbClr val="00B0F0"/>
+                </a:solidFill>
+              </a:rPr>
+              <a:t>What is educational measurement?</a:t>
+            </a:r>
+          </a:p>
+        </p:txBody>
+      </p:sp>
+      <p:sp>
+        <p:nvSpPr>
+          <p:cNvPr id="23" name="Text Placeholder 22">
+            <a:extLst>
+              <a:ext uri="{FF2B5EF4-FFF2-40B4-BE49-F238E27FC236}">
+                <a16:creationId xmlns:a16="http://schemas.microsoft.com/office/drawing/2014/main" id="{3F18EF30-E529-4FFC-FDF3-B1BB1204DCE4}"/>
+              </a:ext>
+            </a:extLst>
+          </p:cNvPr>
+          <p:cNvSpPr>
+            <a:spLocks noGrp="1"/>
+          </p:cNvSpPr>
+          <p:nvPr>
+            <p:ph type="body" sz="quarter" idx="31"/>
+          </p:nvPr>
+        </p:nvSpPr>
+        <p:spPr/>
+        <p:txBody>
+          <a:bodyPr>
+            <a:normAutofit fontScale="92500" lnSpcReduction="10000"/>
+          </a:bodyPr>
+          <a:lstStyle/>
+          <a:p>
+            <a:pPr marL="285750" indent="-285750">
+              <a:buFont typeface="Arial" panose="020B0604020202020204" pitchFamily="34" charset="0"/>
+              <a:buChar char="•"/>
+            </a:pPr>
+            <a:r>
+              <a:rPr lang="en-US" sz="1600" dirty="0"/>
+              <a:t>Measurement concepts</a:t>
+            </a:r>
+          </a:p>
+          <a:p>
+            <a:pPr marL="285750" indent="-285750">
+              <a:buFont typeface="Arial" panose="020B0604020202020204" pitchFamily="34" charset="0"/>
+              <a:buChar char="•"/>
+            </a:pPr>
+            <a:r>
+              <a:rPr lang="en-US" sz="1600" dirty="0"/>
+              <a:t>Assessment Frameworks</a:t>
+            </a:r>
+          </a:p>
+          <a:p>
+            <a:pPr marL="285750" indent="-285750">
+              <a:buFont typeface="Arial" panose="020B0604020202020204" pitchFamily="34" charset="0"/>
+              <a:buChar char="•"/>
+            </a:pPr>
+            <a:r>
+              <a:rPr lang="en-US" sz="1600" dirty="0"/>
+              <a:t>Validity</a:t>
+            </a:r>
+          </a:p>
+        </p:txBody>
+      </p:sp>
+      <p:sp>
+        <p:nvSpPr>
+          <p:cNvPr id="14" name="Text Placeholder 13">
+            <a:extLst>
+              <a:ext uri="{FF2B5EF4-FFF2-40B4-BE49-F238E27FC236}">
+                <a16:creationId xmlns:a16="http://schemas.microsoft.com/office/drawing/2014/main" id="{C99344CC-4D5F-A976-33E9-9CDBC86A9C69}"/>
+              </a:ext>
+            </a:extLst>
+          </p:cNvPr>
+          <p:cNvSpPr>
+            <a:spLocks noGrp="1"/>
+          </p:cNvSpPr>
+          <p:nvPr>
+            <p:ph type="body" sz="quarter" idx="17"/>
+          </p:nvPr>
+        </p:nvSpPr>
+        <p:spPr/>
+        <p:txBody>
+          <a:bodyPr>
+            <a:normAutofit fontScale="92500" lnSpcReduction="20000"/>
+          </a:bodyPr>
+          <a:lstStyle/>
+          <a:p>
+            <a:r>
+              <a:rPr lang="en-GB" dirty="0"/>
+              <a:t>Item Development Principles</a:t>
+            </a:r>
+          </a:p>
+        </p:txBody>
+      </p:sp>
+      <p:sp>
+        <p:nvSpPr>
+          <p:cNvPr id="15" name="Text Placeholder 14">
+            <a:extLst>
+              <a:ext uri="{FF2B5EF4-FFF2-40B4-BE49-F238E27FC236}">
+                <a16:creationId xmlns:a16="http://schemas.microsoft.com/office/drawing/2014/main" id="{6799B0A9-A1F1-A73C-7A68-A479117F5C8C}"/>
+              </a:ext>
+            </a:extLst>
+          </p:cNvPr>
+          <p:cNvSpPr>
+            <a:spLocks noGrp="1"/>
+          </p:cNvSpPr>
+          <p:nvPr>
+            <p:ph type="body" sz="quarter" idx="20"/>
+          </p:nvPr>
+        </p:nvSpPr>
+        <p:spPr/>
+        <p:txBody>
+          <a:bodyPr>
+            <a:normAutofit/>
+          </a:bodyPr>
+          <a:lstStyle/>
+          <a:p>
+            <a:pPr marL="285750" indent="-285750">
+              <a:buFont typeface="Arial" panose="020B0604020202020204" pitchFamily="34" charset="0"/>
+              <a:buChar char="•"/>
+            </a:pPr>
+            <a:r>
+              <a:rPr lang="en-GB" dirty="0"/>
+              <a:t>MC and CR items</a:t>
+            </a:r>
+          </a:p>
+          <a:p>
+            <a:pPr marL="285750" indent="-285750">
+              <a:buFont typeface="Arial" panose="020B0604020202020204" pitchFamily="34" charset="0"/>
+              <a:buChar char="•"/>
+            </a:pPr>
+            <a:r>
+              <a:rPr lang="en-GB" dirty="0"/>
+              <a:t>Using AI in the development process </a:t>
+            </a:r>
+          </a:p>
+        </p:txBody>
+      </p:sp>
+      <p:sp>
+        <p:nvSpPr>
+          <p:cNvPr id="16" name="Text Placeholder 15">
+            <a:extLst>
+              <a:ext uri="{FF2B5EF4-FFF2-40B4-BE49-F238E27FC236}">
+                <a16:creationId xmlns:a16="http://schemas.microsoft.com/office/drawing/2014/main" id="{1C0C61E1-6C3C-DB93-A8CF-9377B9498540}"/>
+              </a:ext>
+            </a:extLst>
+          </p:cNvPr>
+          <p:cNvSpPr>
+            <a:spLocks noGrp="1"/>
+          </p:cNvSpPr>
+          <p:nvPr>
+            <p:ph type="body" sz="quarter" idx="21"/>
+          </p:nvPr>
+        </p:nvSpPr>
+        <p:spPr/>
+        <p:txBody>
+          <a:bodyPr>
+            <a:normAutofit/>
+          </a:bodyPr>
+          <a:lstStyle/>
+          <a:p>
+            <a:r>
+              <a:rPr lang="en-GB" dirty="0"/>
+              <a:t>Item evaluation</a:t>
+            </a:r>
+          </a:p>
+        </p:txBody>
+      </p:sp>
+      <p:sp>
+        <p:nvSpPr>
+          <p:cNvPr id="17" name="Text Placeholder 16">
+            <a:extLst>
+              <a:ext uri="{FF2B5EF4-FFF2-40B4-BE49-F238E27FC236}">
+                <a16:creationId xmlns:a16="http://schemas.microsoft.com/office/drawing/2014/main" id="{CAD27ED7-4097-6BD0-0AB8-CF7E9CD5ACB6}"/>
+              </a:ext>
+            </a:extLst>
+          </p:cNvPr>
+          <p:cNvSpPr>
+            <a:spLocks noGrp="1"/>
+          </p:cNvSpPr>
+          <p:nvPr>
+            <p:ph type="body" sz="quarter" idx="22"/>
+          </p:nvPr>
+        </p:nvSpPr>
+        <p:spPr/>
+        <p:txBody>
+          <a:bodyPr>
+            <a:normAutofit/>
+          </a:bodyPr>
+          <a:lstStyle/>
+          <a:p>
+            <a:pPr marL="285750" indent="-285750">
+              <a:buFont typeface="Arial" panose="020B0604020202020204" pitchFamily="34" charset="0"/>
+              <a:buChar char="•"/>
+            </a:pPr>
+            <a:r>
+              <a:rPr lang="en-GB" dirty="0"/>
+              <a:t>CTT</a:t>
+            </a:r>
+          </a:p>
+          <a:p>
+            <a:pPr marL="285750" indent="-285750">
+              <a:buFont typeface="Arial" panose="020B0604020202020204" pitchFamily="34" charset="0"/>
+              <a:buChar char="•"/>
+            </a:pPr>
+            <a:r>
+              <a:rPr lang="en-GB" dirty="0"/>
+              <a:t>Rasch Measurement/IRT</a:t>
+            </a:r>
+          </a:p>
+        </p:txBody>
+      </p:sp>
+      <p:sp>
+        <p:nvSpPr>
+          <p:cNvPr id="18" name="Text Placeholder 17">
+            <a:extLst>
+              <a:ext uri="{FF2B5EF4-FFF2-40B4-BE49-F238E27FC236}">
+                <a16:creationId xmlns:a16="http://schemas.microsoft.com/office/drawing/2014/main" id="{E025917D-CFFE-8182-E123-6BC8B494D2B8}"/>
+              </a:ext>
+            </a:extLst>
+          </p:cNvPr>
+          <p:cNvSpPr>
+            <a:spLocks noGrp="1"/>
+          </p:cNvSpPr>
+          <p:nvPr>
+            <p:ph type="body" sz="quarter" idx="23"/>
+          </p:nvPr>
+        </p:nvSpPr>
+        <p:spPr/>
+        <p:txBody>
+          <a:bodyPr>
+            <a:normAutofit fontScale="85000" lnSpcReduction="10000"/>
+          </a:bodyPr>
+          <a:lstStyle/>
+          <a:p>
+            <a:r>
+              <a:rPr lang="en-GB" dirty="0"/>
+              <a:t>Test construction and test evaluation</a:t>
+            </a:r>
+          </a:p>
+        </p:txBody>
+      </p:sp>
+      <p:sp>
+        <p:nvSpPr>
+          <p:cNvPr id="19" name="Text Placeholder 18">
+            <a:extLst>
+              <a:ext uri="{FF2B5EF4-FFF2-40B4-BE49-F238E27FC236}">
+                <a16:creationId xmlns:a16="http://schemas.microsoft.com/office/drawing/2014/main" id="{2C6DB3CE-994B-F6B8-D7F4-CCAFB7D83B4D}"/>
+              </a:ext>
+            </a:extLst>
+          </p:cNvPr>
+          <p:cNvSpPr>
+            <a:spLocks noGrp="1"/>
+          </p:cNvSpPr>
+          <p:nvPr>
+            <p:ph type="body" sz="quarter" idx="24"/>
+          </p:nvPr>
+        </p:nvSpPr>
+        <p:spPr/>
+        <p:txBody>
+          <a:bodyPr>
+            <a:normAutofit/>
+          </a:bodyPr>
+          <a:lstStyle/>
+          <a:p>
+            <a:pPr marL="285750" indent="-285750">
+              <a:buFont typeface="Arial" panose="020B0604020202020204" pitchFamily="34" charset="0"/>
+              <a:buChar char="•"/>
+            </a:pPr>
+            <a:r>
+              <a:rPr lang="en-GB" dirty="0"/>
+              <a:t>Booklet designs </a:t>
+            </a:r>
+          </a:p>
+          <a:p>
+            <a:pPr marL="285750" indent="-285750">
+              <a:buFont typeface="Arial" panose="020B0604020202020204" pitchFamily="34" charset="0"/>
+              <a:buChar char="•"/>
+            </a:pPr>
+            <a:r>
+              <a:rPr lang="en-GB" dirty="0"/>
+              <a:t>Test equating</a:t>
+            </a:r>
+          </a:p>
+        </p:txBody>
+      </p:sp>
+      <p:sp>
+        <p:nvSpPr>
+          <p:cNvPr id="20" name="Text Placeholder 19">
+            <a:extLst>
+              <a:ext uri="{FF2B5EF4-FFF2-40B4-BE49-F238E27FC236}">
+                <a16:creationId xmlns:a16="http://schemas.microsoft.com/office/drawing/2014/main" id="{BF693A22-4C8C-B657-0484-08BF9A503852}"/>
+              </a:ext>
+            </a:extLst>
+          </p:cNvPr>
+          <p:cNvSpPr>
+            <a:spLocks noGrp="1"/>
+          </p:cNvSpPr>
+          <p:nvPr>
+            <p:ph type="body" sz="quarter" idx="25"/>
+          </p:nvPr>
+        </p:nvSpPr>
+        <p:spPr/>
+        <p:txBody>
+          <a:bodyPr>
+            <a:normAutofit fontScale="77500" lnSpcReduction="20000"/>
+          </a:bodyPr>
+          <a:lstStyle/>
+          <a:p>
+            <a:r>
+              <a:rPr lang="en-GB" dirty="0"/>
+              <a:t>Cognitive Walkthroughs in Item Development</a:t>
+            </a:r>
+          </a:p>
+        </p:txBody>
+      </p:sp>
+      <p:sp>
+        <p:nvSpPr>
+          <p:cNvPr id="21" name="Text Placeholder 20">
+            <a:extLst>
+              <a:ext uri="{FF2B5EF4-FFF2-40B4-BE49-F238E27FC236}">
+                <a16:creationId xmlns:a16="http://schemas.microsoft.com/office/drawing/2014/main" id="{C684ECC0-9A38-8280-1B8E-C5EED91C17E1}"/>
+              </a:ext>
+            </a:extLst>
+          </p:cNvPr>
+          <p:cNvSpPr>
+            <a:spLocks noGrp="1"/>
+          </p:cNvSpPr>
+          <p:nvPr>
+            <p:ph type="body" sz="quarter" idx="26"/>
+          </p:nvPr>
+        </p:nvSpPr>
+        <p:spPr/>
+        <p:txBody>
+          <a:bodyPr>
+            <a:normAutofit/>
+          </a:bodyPr>
+          <a:lstStyle/>
+          <a:p>
+            <a:pPr marL="285750" indent="-285750">
+              <a:buFont typeface="Arial" panose="020B0604020202020204" pitchFamily="34" charset="0"/>
+              <a:buChar char="•"/>
+            </a:pPr>
+            <a:r>
+              <a:rPr lang="en-GB" dirty="0"/>
+              <a:t>The role and process of collaborative review in item development</a:t>
+            </a:r>
+          </a:p>
+        </p:txBody>
+      </p:sp>
+    </p:spTree>
+    <p:extLst>
+      <p:ext uri="{BB962C8B-B14F-4D97-AF65-F5344CB8AC3E}">
+        <p14:creationId xmlns:p14="http://schemas.microsoft.com/office/powerpoint/2010/main" val="410752877"/>
+      </p:ext>
+    </p:extLst>
+  </p:cSld>
+  <p:clrMapOvr>
+    <a:overrideClrMapping bg1="lt1" tx1="dk1" bg2="lt2" tx2="dk2" accent1="accent1" accent2="accent2" accent3="accent3" accent4="accent4" accent5="accent5" accent6="accent6" hlink="hlink" folHlink="folHlink"/>
+  </p:clrMapOvr>
+</p:sld>
+</file>
+
+<file path=ppt/slides/slide21.xml><?xml version="1.0" encoding="utf-8"?>
+<p:sld xmlns:a="http://schemas.openxmlformats.org/drawingml/2006/main" xmlns:r="http://schemas.openxmlformats.org/officeDocument/2006/relationships" xmlns:p="http://schemas.openxmlformats.org/presentationml/2006/main">
+  <p:cSld>
+    <p:bg>
+      <p:bgRef idx="1001">
+        <a:schemeClr val="bg1"/>
+      </p:bgRef>
+    </p:bg>
+    <p:spTree>
+      <p:nvGrpSpPr>
+        <p:cNvPr id="1" name=""/>
+        <p:cNvGrpSpPr/>
+        <p:nvPr/>
+      </p:nvGrpSpPr>
+      <p:grpSpPr>
+        <a:xfrm>
+          <a:off x="0" y="0"/>
+          <a:ext cx="0" cy="0"/>
+          <a:chOff x="0" y="0"/>
+          <a:chExt cx="0" cy="0"/>
+        </a:xfrm>
+      </p:grpSpPr>
+      <p:sp>
+        <p:nvSpPr>
           <p:cNvPr id="15" name="Text Placeholder 14">
             <a:extLst>
               <a:ext uri="{FF2B5EF4-FFF2-40B4-BE49-F238E27FC236}">
@@ -49699,7 +49835,7 @@
 </p:sld>
 </file>
 
-<file path=ppt/slides/slide21.xml><?xml version="1.0" encoding="utf-8"?>
+<file path=ppt/slides/slide22.xml><?xml version="1.0" encoding="utf-8"?>
 <p:sld xmlns:a="http://schemas.openxmlformats.org/drawingml/2006/main" xmlns:r="http://schemas.openxmlformats.org/officeDocument/2006/relationships" xmlns:p="http://schemas.openxmlformats.org/presentationml/2006/main">
   <p:cSld>
     <p:bg>
@@ -49801,7 +49937,7 @@
 </p:sld>
 </file>
 
-<file path=ppt/slides/slide22.xml><?xml version="1.0" encoding="utf-8"?>
+<file path=ppt/slides/slide23.xml><?xml version="1.0" encoding="utf-8"?>
 <p:sld xmlns:a="http://schemas.openxmlformats.org/drawingml/2006/main" xmlns:r="http://schemas.openxmlformats.org/officeDocument/2006/relationships" xmlns:p="http://schemas.openxmlformats.org/presentationml/2006/main">
   <p:cSld>
     <p:bg>
@@ -50215,6 +50351,100 @@
       </p:grpSpPr>
       <p:sp>
         <p:nvSpPr>
+          <p:cNvPr id="12" name="Title 11">
+            <a:extLst>
+              <a:ext uri="{FF2B5EF4-FFF2-40B4-BE49-F238E27FC236}">
+                <a16:creationId xmlns:a16="http://schemas.microsoft.com/office/drawing/2014/main" id="{A876740F-1F61-00C7-87E0-506362FE0814}"/>
+              </a:ext>
+            </a:extLst>
+          </p:cNvPr>
+          <p:cNvSpPr>
+            <a:spLocks noGrp="1"/>
+          </p:cNvSpPr>
+          <p:nvPr>
+            <p:ph type="title"/>
+          </p:nvPr>
+        </p:nvSpPr>
+        <p:spPr/>
+        <p:txBody>
+          <a:bodyPr/>
+          <a:lstStyle/>
+          <a:p>
+            <a:r>
+              <a:rPr lang="en-GB" dirty="0"/>
+              <a:t>Homework Submission</a:t>
+            </a:r>
+          </a:p>
+        </p:txBody>
+      </p:sp>
+      <p:pic>
+        <p:nvPicPr>
+          <p:cNvPr id="14" name="Graphic 13">
+            <a:extLst>
+              <a:ext uri="{FF2B5EF4-FFF2-40B4-BE49-F238E27FC236}">
+                <a16:creationId xmlns:a16="http://schemas.microsoft.com/office/drawing/2014/main" id="{27ABA9DD-2911-C348-6476-00AA5B76660C}"/>
+              </a:ext>
+            </a:extLst>
+          </p:cNvPr>
+          <p:cNvPicPr>
+            <a:picLocks noChangeAspect="1"/>
+          </p:cNvPicPr>
+          <p:nvPr/>
+        </p:nvPicPr>
+        <p:blipFill>
+          <a:blip r:embed="rId2">
+            <a:extLst>
+              <a:ext uri="{96DAC541-7B7A-43D3-8B79-37D633B846F1}">
+                <asvg:svgBlip xmlns:asvg="http://schemas.microsoft.com/office/drawing/2016/SVG/main" r:embed="rId3"/>
+              </a:ext>
+            </a:extLst>
+          </a:blip>
+          <a:stretch>
+            <a:fillRect/>
+          </a:stretch>
+        </p:blipFill>
+        <p:spPr>
+          <a:xfrm>
+            <a:off x="4247589" y="1865778"/>
+            <a:ext cx="3696821" cy="3696821"/>
+          </a:xfrm>
+          <a:prstGeom prst="rect">
+            <a:avLst/>
+          </a:prstGeom>
+        </p:spPr>
+      </p:pic>
+    </p:spTree>
+    <p:extLst>
+      <p:ext uri="{BB962C8B-B14F-4D97-AF65-F5344CB8AC3E}">
+        <p14:creationId xmlns:p14="http://schemas.microsoft.com/office/powerpoint/2010/main" val="2475986140"/>
+      </p:ext>
+    </p:extLst>
+  </p:cSld>
+  <p:clrMapOvr>
+    <a:masterClrMapping/>
+  </p:clrMapOvr>
+</p:sld>
+</file>
+
+<file path=ppt/slides/slide5.xml><?xml version="1.0" encoding="utf-8"?>
+<p:sld xmlns:a="http://schemas.openxmlformats.org/drawingml/2006/main" xmlns:r="http://schemas.openxmlformats.org/officeDocument/2006/relationships" xmlns:p="http://schemas.openxmlformats.org/presentationml/2006/main">
+  <p:cSld>
+    <p:spTree>
+      <p:nvGrpSpPr>
+        <p:cNvPr id="1" name=""/>
+        <p:cNvGrpSpPr/>
+        <p:nvPr/>
+      </p:nvGrpSpPr>
+      <p:grpSpPr>
+        <a:xfrm>
+          <a:off x="0" y="0"/>
+          <a:ext cx="0" cy="0"/>
+          <a:chOff x="0" y="0"/>
+          <a:chExt cx="0" cy="0"/>
+        </a:xfrm>
+      </p:grpSpPr>
+      <p:sp>
+        <p:nvSpPr>
           <p:cNvPr id="2" name="Text Placeholder 1">
             <a:extLst>
               <a:ext uri="{FF2B5EF4-FFF2-40B4-BE49-F238E27FC236}">
@@ -50289,7 +50519,7 @@
 </p:sld>
 </file>
 
-<file path=ppt/slides/slide5.xml><?xml version="1.0" encoding="utf-8"?>
+<file path=ppt/slides/slide6.xml><?xml version="1.0" encoding="utf-8"?>
 <p:sld xmlns:a="http://schemas.openxmlformats.org/drawingml/2006/main" xmlns:r="http://schemas.openxmlformats.org/officeDocument/2006/relationships" xmlns:p="http://schemas.openxmlformats.org/presentationml/2006/main">
   <p:cSld>
     <p:spTree>
@@ -50375,7 +50605,7 @@
 </p:sld>
 </file>
 
-<file path=ppt/slides/slide6.xml><?xml version="1.0" encoding="utf-8"?>
+<file path=ppt/slides/slide7.xml><?xml version="1.0" encoding="utf-8"?>
 <p:sld xmlns:a="http://schemas.openxmlformats.org/drawingml/2006/main" xmlns:r="http://schemas.openxmlformats.org/officeDocument/2006/relationships" xmlns:p="http://schemas.openxmlformats.org/presentationml/2006/main">
   <p:cSld>
     <p:spTree>
@@ -50693,7 +50923,7 @@
 </p:sld>
 </file>
 
-<file path=ppt/slides/slide7.xml><?xml version="1.0" encoding="utf-8"?>
+<file path=ppt/slides/slide8.xml><?xml version="1.0" encoding="utf-8"?>
 <p:sld xmlns:a="http://schemas.openxmlformats.org/drawingml/2006/main" xmlns:r="http://schemas.openxmlformats.org/officeDocument/2006/relationships" xmlns:p="http://schemas.openxmlformats.org/presentationml/2006/main">
   <p:cSld>
     <p:bg>
@@ -50948,7 +51178,7 @@
 </p:sld>
 </file>
 
-<file path=ppt/slides/slide8.xml><?xml version="1.0" encoding="utf-8"?>
+<file path=ppt/slides/slide9.xml><?xml version="1.0" encoding="utf-8"?>
 <p:sld xmlns:a="http://schemas.openxmlformats.org/drawingml/2006/main" xmlns:r="http://schemas.openxmlformats.org/officeDocument/2006/relationships" xmlns:p="http://schemas.openxmlformats.org/presentationml/2006/main">
   <p:cSld>
     <p:bg>
@@ -51127,141 +51357,6 @@
     <p:extLst>
       <p:ext uri="{BB962C8B-B14F-4D97-AF65-F5344CB8AC3E}">
         <p14:creationId xmlns:p14="http://schemas.microsoft.com/office/powerpoint/2010/main" val="2982538696"/>
-      </p:ext>
-    </p:extLst>
-  </p:cSld>
-  <p:clrMapOvr>
-    <a:overrideClrMapping bg1="lt1" tx1="dk1" bg2="lt2" tx2="dk2" accent1="accent1" accent2="accent2" accent3="accent3" accent4="accent4" accent5="accent5" accent6="accent6" hlink="hlink" folHlink="folHlink"/>
-  </p:clrMapOvr>
-</p:sld>
-</file>
-
-<file path=ppt/slides/slide9.xml><?xml version="1.0" encoding="utf-8"?>
-<p:sld xmlns:a="http://schemas.openxmlformats.org/drawingml/2006/main" xmlns:r="http://schemas.openxmlformats.org/officeDocument/2006/relationships" xmlns:p="http://schemas.openxmlformats.org/presentationml/2006/main">
-  <p:cSld>
-    <p:bg>
-      <p:bgRef idx="1001">
-        <a:schemeClr val="bg1"/>
-      </p:bgRef>
-    </p:bg>
-    <p:spTree>
-      <p:nvGrpSpPr>
-        <p:cNvPr id="1" name=""/>
-        <p:cNvGrpSpPr/>
-        <p:nvPr/>
-      </p:nvGrpSpPr>
-      <p:grpSpPr>
-        <a:xfrm>
-          <a:off x="0" y="0"/>
-          <a:ext cx="0" cy="0"/>
-          <a:chOff x="0" y="0"/>
-          <a:chExt cx="0" cy="0"/>
-        </a:xfrm>
-      </p:grpSpPr>
-      <p:sp>
-        <p:nvSpPr>
-          <p:cNvPr id="2" name="Text Placeholder 1">
-            <a:extLst>
-              <a:ext uri="{FF2B5EF4-FFF2-40B4-BE49-F238E27FC236}">
-                <a16:creationId xmlns:a16="http://schemas.microsoft.com/office/drawing/2014/main" id="{62DF4EC1-2B15-244C-5313-92DF99A8D408}"/>
-              </a:ext>
-            </a:extLst>
-          </p:cNvPr>
-          <p:cNvSpPr>
-            <a:spLocks noGrp="1"/>
-          </p:cNvSpPr>
-          <p:nvPr>
-            <p:ph type="body" sz="quarter" idx="14"/>
-          </p:nvPr>
-        </p:nvSpPr>
-        <p:spPr/>
-        <p:txBody>
-          <a:bodyPr/>
-          <a:lstStyle/>
-          <a:p>
-            <a:pPr marL="0" indent="0">
-              <a:buNone/>
-            </a:pPr>
-            <a:r>
-              <a:rPr lang="en-GB" dirty="0"/>
-              <a:t>Things to try to remember when your unit is under review:</a:t>
-            </a:r>
-          </a:p>
-          <a:p>
-            <a:r>
-              <a:rPr lang="en-GB" b="1" dirty="0"/>
-              <a:t>You are not your work.</a:t>
-            </a:r>
-            <a:endParaRPr lang="en-GB" dirty="0"/>
-          </a:p>
-          <a:p>
-            <a:pPr lvl="1"/>
-            <a:r>
-              <a:rPr lang="en-GB" dirty="0"/>
-              <a:t>Try hard to keep in mind that all critiques are about the unit, not you. </a:t>
-            </a:r>
-          </a:p>
-          <a:p>
-            <a:pPr lvl="1"/>
-            <a:r>
-              <a:rPr lang="en-GB" dirty="0"/>
-              <a:t>They are not judgments about you or your intelligence, experience, capacity, etc.</a:t>
-            </a:r>
-          </a:p>
-          <a:p>
-            <a:r>
-              <a:rPr lang="en-GB" dirty="0"/>
-              <a:t>It is OK to tell the group, at any point:</a:t>
-            </a:r>
-          </a:p>
-          <a:p>
-            <a:pPr lvl="1"/>
-            <a:r>
-              <a:rPr lang="en-GB" dirty="0"/>
-              <a:t>“I’m finding this hard. Can we take a break?” </a:t>
-            </a:r>
-          </a:p>
-          <a:p>
-            <a:pPr lvl="1"/>
-            <a:r>
-              <a:rPr lang="en-GB" dirty="0"/>
-              <a:t>“Can we look at another unit and come back to this one later?”</a:t>
-            </a:r>
-          </a:p>
-        </p:txBody>
-      </p:sp>
-      <p:sp>
-        <p:nvSpPr>
-          <p:cNvPr id="3" name="Title 2">
-            <a:extLst>
-              <a:ext uri="{FF2B5EF4-FFF2-40B4-BE49-F238E27FC236}">
-                <a16:creationId xmlns:a16="http://schemas.microsoft.com/office/drawing/2014/main" id="{7FFDCD27-7B34-8F8D-8484-E3888962C329}"/>
-              </a:ext>
-            </a:extLst>
-          </p:cNvPr>
-          <p:cNvSpPr>
-            <a:spLocks noGrp="1"/>
-          </p:cNvSpPr>
-          <p:nvPr>
-            <p:ph type="title"/>
-          </p:nvPr>
-        </p:nvSpPr>
-        <p:spPr/>
-        <p:txBody>
-          <a:bodyPr/>
-          <a:lstStyle/>
-          <a:p>
-            <a:r>
-              <a:rPr lang="en-GB" dirty="0"/>
-              <a:t>Critical distance ‘under the spotlight’</a:t>
-            </a:r>
-          </a:p>
-        </p:txBody>
-      </p:sp>
-    </p:spTree>
-    <p:extLst>
-      <p:ext uri="{BB962C8B-B14F-4D97-AF65-F5344CB8AC3E}">
-        <p14:creationId xmlns:p14="http://schemas.microsoft.com/office/powerpoint/2010/main" val="1225007372"/>
       </p:ext>
     </p:extLst>
   </p:cSld>
@@ -53222,6 +53317,17 @@
 </file>
 
 <file path=customXml/item2.xml><?xml version="1.0" encoding="utf-8"?>
+<p:properties xmlns:p="http://schemas.microsoft.com/office/2006/metadata/properties" xmlns:xsi="http://www.w3.org/2001/XMLSchema-instance" xmlns:pc="http://schemas.microsoft.com/office/infopath/2007/PartnerControls">
+  <documentManagement>
+    <lcf76f155ced4ddcb4097134ff3c332f xmlns="f48e0371-e5a1-4434-9921-99c130702a89">
+      <Terms xmlns="http://schemas.microsoft.com/office/infopath/2007/PartnerControls"/>
+    </lcf76f155ced4ddcb4097134ff3c332f>
+    <TaxCatchAll xmlns="f1524577-e775-4792-9e02-59d88675d35f" xsi:nil="true"/>
+  </documentManagement>
+</p:properties>
+</file>
+
+<file path=customXml/item3.xml><?xml version="1.0" encoding="utf-8"?>
 <ct:contentTypeSchema xmlns:ct="http://schemas.microsoft.com/office/2006/metadata/contentType" xmlns:ma="http://schemas.microsoft.com/office/2006/metadata/properties/metaAttributes" ct:_="" ma:_="" ma:contentTypeName="Document" ma:contentTypeID="0x010100A9CE1C22E302D54A92E3B27F42531170" ma:contentTypeVersion="18" ma:contentTypeDescription="Create a new document." ma:contentTypeScope="" ma:versionID="e7baf0caf837d1a6ee69fbbb52e60e83">
   <xsd:schema xmlns:xsd="http://www.w3.org/2001/XMLSchema" xmlns:xs="http://www.w3.org/2001/XMLSchema" xmlns:p="http://schemas.microsoft.com/office/2006/metadata/properties" xmlns:ns2="f48e0371-e5a1-4434-9921-99c130702a89" xmlns:ns3="f1524577-e775-4792-9e02-59d88675d35f" targetNamespace="http://schemas.microsoft.com/office/2006/metadata/properties" ma:root="true" ma:fieldsID="c393747ab2179622d80a78a13a0c22e4" ns2:_="" ns3:_="">
     <xsd:import namespace="f48e0371-e5a1-4434-9921-99c130702a89"/>
@@ -53476,17 +53582,6 @@
 </ct:contentTypeSchema>
 </file>
 
-<file path=customXml/item3.xml><?xml version="1.0" encoding="utf-8"?>
-<p:properties xmlns:p="http://schemas.microsoft.com/office/2006/metadata/properties" xmlns:xsi="http://www.w3.org/2001/XMLSchema-instance" xmlns:pc="http://schemas.microsoft.com/office/infopath/2007/PartnerControls">
-  <documentManagement>
-    <lcf76f155ced4ddcb4097134ff3c332f xmlns="f48e0371-e5a1-4434-9921-99c130702a89">
-      <Terms xmlns="http://schemas.microsoft.com/office/infopath/2007/PartnerControls"/>
-    </lcf76f155ced4ddcb4097134ff3c332f>
-    <TaxCatchAll xmlns="f1524577-e775-4792-9e02-59d88675d35f" xsi:nil="true"/>
-  </documentManagement>
-</p:properties>
-</file>
-
 <file path=customXml/itemProps1.xml><?xml version="1.0" encoding="utf-8"?>
 <ds:datastoreItem xmlns:ds="http://schemas.openxmlformats.org/officeDocument/2006/customXml" ds:itemID="{4555E040-F903-4557-B5BA-FEEA81916D11}">
   <ds:schemaRefs>
@@ -53496,6 +53591,23 @@
 </file>
 
 <file path=customXml/itemProps2.xml><?xml version="1.0" encoding="utf-8"?>
+<ds:datastoreItem xmlns:ds="http://schemas.openxmlformats.org/officeDocument/2006/customXml" ds:itemID="{E63F9314-2156-4A26-9C7B-3A436590D2E6}">
+  <ds:schemaRefs>
+    <ds:schemaRef ds:uri="http://schemas.microsoft.com/office/2006/documentManagement/types"/>
+    <ds:schemaRef ds:uri="http://www.w3.org/XML/1998/namespace"/>
+    <ds:schemaRef ds:uri="http://schemas.microsoft.com/office/2006/metadata/properties"/>
+    <ds:schemaRef ds:uri="http://purl.org/dc/elements/1.1/"/>
+    <ds:schemaRef ds:uri="http://schemas.openxmlformats.org/package/2006/metadata/core-properties"/>
+    <ds:schemaRef ds:uri="http://purl.org/dc/terms/"/>
+    <ds:schemaRef ds:uri="http://schemas.microsoft.com/office/infopath/2007/PartnerControls"/>
+    <ds:schemaRef ds:uri="f1524577-e775-4792-9e02-59d88675d35f"/>
+    <ds:schemaRef ds:uri="f48e0371-e5a1-4434-9921-99c130702a89"/>
+    <ds:schemaRef ds:uri="http://purl.org/dc/dcmitype/"/>
+  </ds:schemaRefs>
+</ds:datastoreItem>
+</file>
+
+<file path=customXml/itemProps3.xml><?xml version="1.0" encoding="utf-8"?>
 <ds:datastoreItem xmlns:ds="http://schemas.openxmlformats.org/officeDocument/2006/customXml" ds:itemID="{47B0B96C-27C4-4CB7-95AA-6F7118EE0252}">
   <ds:schemaRefs>
     <ds:schemaRef ds:uri="http://schemas.microsoft.com/office/2006/metadata/contentType"/>
@@ -53512,21 +53624,4 @@
     <ds:schemaRef ds:uri="http://schemas.microsoft.com/internal/obd"/>
   </ds:schemaRefs>
 </ds:datastoreItem>
-</file>
-
-<file path=customXml/itemProps3.xml><?xml version="1.0" encoding="utf-8"?>
-<ds:datastoreItem xmlns:ds="http://schemas.openxmlformats.org/officeDocument/2006/customXml" ds:itemID="{E63F9314-2156-4A26-9C7B-3A436590D2E6}">
-  <ds:schemaRefs>
-    <ds:schemaRef ds:uri="http://schemas.microsoft.com/office/2006/documentManagement/types"/>
-    <ds:schemaRef ds:uri="http://www.w3.org/XML/1998/namespace"/>
-    <ds:schemaRef ds:uri="http://schemas.microsoft.com/office/2006/metadata/properties"/>
-    <ds:schemaRef ds:uri="http://purl.org/dc/elements/1.1/"/>
-    <ds:schemaRef ds:uri="http://schemas.openxmlformats.org/package/2006/metadata/core-properties"/>
-    <ds:schemaRef ds:uri="http://purl.org/dc/terms/"/>
-    <ds:schemaRef ds:uri="http://schemas.microsoft.com/office/infopath/2007/PartnerControls"/>
-    <ds:schemaRef ds:uri="f1524577-e775-4792-9e02-59d88675d35f"/>
-    <ds:schemaRef ds:uri="f48e0371-e5a1-4434-9921-99c130702a89"/>
-    <ds:schemaRef ds:uri="http://purl.org/dc/dcmitype/"/>
-  </ds:schemaRefs>
-</ds:datastoreItem>
 </file>
</xml_diff>